<commit_message>
Se agrega diagrama de despliegue y la diapositiva presentacion
</commit_message>
<xml_diff>
--- a/prestacion-proyecto.pptx
+++ b/prestacion-proyecto.pptx
@@ -5,7 +5,7 @@
     <p:sldMasterId id="2147483648" r:id="rId1"/>
   </p:sldMasterIdLst>
   <p:notesMasterIdLst>
-    <p:notesMasterId r:id="rId12"/>
+    <p:notesMasterId r:id="rId13"/>
   </p:notesMasterIdLst>
   <p:sldIdLst>
     <p:sldId id="256" r:id="rId2"/>
@@ -15,9 +15,10 @@
     <p:sldId id="261" r:id="rId6"/>
     <p:sldId id="258" r:id="rId7"/>
     <p:sldId id="267" r:id="rId8"/>
-    <p:sldId id="268" r:id="rId9"/>
-    <p:sldId id="264" r:id="rId10"/>
-    <p:sldId id="259" r:id="rId11"/>
+    <p:sldId id="269" r:id="rId9"/>
+    <p:sldId id="268" r:id="rId10"/>
+    <p:sldId id="264" r:id="rId11"/>
+    <p:sldId id="259" r:id="rId12"/>
   </p:sldIdLst>
   <p:sldSz cx="9144000" cy="5143500" type="screen16x9"/>
   <p:notesSz cx="6858000" cy="9144000"/>
@@ -217,7 +218,7 @@
           <a:p>
             <a:fld id="{821652C1-54FA-CD46-90EF-082DF126EC89}" type="datetimeFigureOut">
               <a:rPr lang="es-ES" smtClean="0"/>
-              <a:t>20/09/2019</a:t>
+              <a:t>30/09/2019</a:t>
             </a:fld>
             <a:endParaRPr lang="es-ES"/>
           </a:p>
@@ -281,35 +282,35 @@
           <a:p>
             <a:pPr lvl="0"/>
             <a:r>
-              <a:rPr lang="es-ES_tradnl" smtClean="0"/>
+              <a:rPr lang="es-ES_tradnl"/>
               <a:t>Haga clic para modificar el estilo de texto del patrón</a:t>
             </a:r>
           </a:p>
           <a:p>
             <a:pPr lvl="1"/>
             <a:r>
-              <a:rPr lang="es-ES_tradnl" smtClean="0"/>
+              <a:rPr lang="es-ES_tradnl"/>
               <a:t>Segundo nivel</a:t>
             </a:r>
           </a:p>
           <a:p>
             <a:pPr lvl="2"/>
             <a:r>
-              <a:rPr lang="es-ES_tradnl" smtClean="0"/>
+              <a:rPr lang="es-ES_tradnl"/>
               <a:t>Tercer nivel</a:t>
             </a:r>
           </a:p>
           <a:p>
             <a:pPr lvl="3"/>
             <a:r>
-              <a:rPr lang="es-ES_tradnl" smtClean="0"/>
+              <a:rPr lang="es-ES_tradnl"/>
               <a:t>Cuarto nivel</a:t>
             </a:r>
           </a:p>
           <a:p>
             <a:pPr lvl="4"/>
             <a:r>
-              <a:rPr lang="es-ES_tradnl" smtClean="0"/>
+              <a:rPr lang="es-ES_tradnl"/>
               <a:t>Quinto nivel</a:t>
             </a:r>
             <a:endParaRPr lang="es-ES"/>
@@ -530,11 +531,11 @@
           <a:lstStyle/>
           <a:p>
             <a:r>
-              <a:rPr lang="es-ES" dirty="0" smtClean="0"/>
+              <a:rPr lang="es-ES" dirty="0"/>
               <a:t>Esta diapositiva no</a:t>
             </a:r>
             <a:r>
-              <a:rPr lang="es-ES" baseline="0" dirty="0" smtClean="0"/>
+              <a:rPr lang="es-ES" baseline="0" dirty="0"/>
               <a:t> se debe modificar, es la portada y debe permanecer igual para todas las presentaciones</a:t>
             </a:r>
             <a:endParaRPr lang="es-ES" dirty="0"/>
@@ -626,11 +627,11 @@
               <a:buChar char="-"/>
             </a:pPr>
             <a:r>
-              <a:rPr lang="es-ES" dirty="0" smtClean="0"/>
+              <a:rPr lang="es-ES" dirty="0"/>
               <a:t>Escriba en esta diapositiva el titulo de</a:t>
             </a:r>
             <a:r>
-              <a:rPr lang="es-ES" baseline="0" dirty="0" smtClean="0"/>
+              <a:rPr lang="es-ES" baseline="0" dirty="0"/>
               <a:t> la presentación y si lo desea puede agregar los temas que va exponer.</a:t>
             </a:r>
           </a:p>
@@ -640,7 +641,7 @@
               <a:buChar char="-"/>
             </a:pPr>
             <a:r>
-              <a:rPr lang="es-ES" baseline="0" dirty="0" smtClean="0"/>
+              <a:rPr lang="es-ES" baseline="0" dirty="0"/>
               <a:t>Si va a dejar solo el titulo déjelo centrado en la diapositiva.</a:t>
             </a:r>
           </a:p>
@@ -650,7 +651,7 @@
               <a:buChar char="-"/>
             </a:pPr>
             <a:r>
-              <a:rPr lang="es-ES" baseline="0" dirty="0" smtClean="0"/>
+              <a:rPr lang="es-ES" baseline="0" dirty="0"/>
               <a:t>Los textos deben ir en color blanco en tipografía Arial.</a:t>
             </a:r>
             <a:endParaRPr lang="es-ES" dirty="0"/>
@@ -742,19 +743,19 @@
               <a:buChar char="-"/>
             </a:pPr>
             <a:r>
-              <a:rPr lang="es-ES" dirty="0" smtClean="0"/>
+              <a:rPr lang="es-ES" dirty="0"/>
               <a:t>Utilice</a:t>
             </a:r>
             <a:r>
-              <a:rPr lang="es-ES" baseline="0" dirty="0" smtClean="0"/>
+              <a:rPr lang="es-ES" baseline="0" dirty="0"/>
               <a:t> esta diapositiva si</a:t>
             </a:r>
             <a:r>
-              <a:rPr lang="es-ES" dirty="0" smtClean="0"/>
+              <a:rPr lang="es-ES" dirty="0"/>
               <a:t> necesita</a:t>
             </a:r>
             <a:r>
-              <a:rPr lang="es-ES" baseline="0" dirty="0" smtClean="0"/>
+              <a:rPr lang="es-ES" baseline="0" dirty="0"/>
               <a:t> incluir textos más extensos.</a:t>
             </a:r>
           </a:p>
@@ -764,10 +765,10 @@
               <a:buChar char="-"/>
             </a:pPr>
             <a:r>
-              <a:rPr lang="es-ES" baseline="0" dirty="0" smtClean="0"/>
+              <a:rPr lang="es-ES" baseline="0" dirty="0"/>
               <a:t>Los textos deben ir en azul (utilice el azul que aparece en la opciones de color de letra - -&gt; colores recientes) en tipografía Arial y justificados.</a:t>
             </a:r>
-            <a:endParaRPr lang="es-ES" dirty="0" smtClean="0"/>
+            <a:endParaRPr lang="es-ES" dirty="0"/>
           </a:p>
           <a:p>
             <a:pPr marL="171450" indent="-171450">
@@ -775,10 +776,10 @@
               <a:buChar char="-"/>
             </a:pPr>
             <a:r>
-              <a:rPr lang="es-ES" baseline="0" dirty="0" smtClean="0"/>
+              <a:rPr lang="es-ES" baseline="0" dirty="0"/>
               <a:t>Asegúrese que los textos no se monten sobre la franja verde.</a:t>
             </a:r>
-            <a:endParaRPr lang="es-ES" dirty="0" smtClean="0"/>
+            <a:endParaRPr lang="es-ES" dirty="0"/>
           </a:p>
         </p:txBody>
       </p:sp>
@@ -867,11 +868,11 @@
               <a:buChar char="-"/>
             </a:pPr>
             <a:r>
-              <a:rPr lang="es-ES" dirty="0" smtClean="0"/>
+              <a:rPr lang="es-ES" dirty="0"/>
               <a:t>En</a:t>
             </a:r>
             <a:r>
-              <a:rPr lang="es-ES" baseline="0" dirty="0" smtClean="0"/>
+              <a:rPr lang="es-ES" baseline="0" dirty="0"/>
               <a:t> esta diapositiva puede colocar contenidos y acompañarlos con una fotografía que vaya a lo alto del formato.</a:t>
             </a:r>
           </a:p>
@@ -881,10 +882,10 @@
               <a:buChar char="-"/>
             </a:pPr>
             <a:r>
-              <a:rPr lang="es-ES" baseline="0" dirty="0" smtClean="0"/>
+              <a:rPr lang="es-ES" baseline="0" dirty="0"/>
               <a:t>Los textos deben ir en azul (utilice el azul que aparece en la opciones de color de letra - -&gt; colores recientes) en tipografía Arial y justificados.</a:t>
             </a:r>
-            <a:endParaRPr lang="es-ES" dirty="0" smtClean="0"/>
+            <a:endParaRPr lang="es-ES" dirty="0"/>
           </a:p>
           <a:p>
             <a:endParaRPr lang="es-ES" dirty="0"/>
@@ -976,10 +977,10 @@
               <a:buChar char="-"/>
             </a:pPr>
             <a:r>
-              <a:rPr lang="es-ES" dirty="0" smtClean="0"/>
+              <a:rPr lang="es-ES" dirty="0"/>
               <a:t>Utilice esta diapositiva para incluir tablas y gráficos.</a:t>
             </a:r>
-            <a:endParaRPr lang="es-ES" baseline="0" dirty="0" smtClean="0"/>
+            <a:endParaRPr lang="es-ES" baseline="0" dirty="0"/>
           </a:p>
           <a:p>
             <a:pPr marL="171450" indent="-171450">
@@ -987,10 +988,10 @@
               <a:buChar char="-"/>
             </a:pPr>
             <a:r>
-              <a:rPr lang="es-ES" baseline="0" dirty="0" smtClean="0"/>
+              <a:rPr lang="es-ES" baseline="0" dirty="0"/>
               <a:t>Los textos deben ir en azul (utilice el azul que aparece en la opciones de color de letra - -&gt; colores recientes) en tipografía Arial.</a:t>
             </a:r>
-            <a:endParaRPr lang="es-ES" dirty="0" smtClean="0"/>
+            <a:endParaRPr lang="es-ES" dirty="0"/>
           </a:p>
         </p:txBody>
       </p:sp>
@@ -1079,11 +1080,11 @@
               <a:buChar char="-"/>
             </a:pPr>
             <a:r>
-              <a:rPr lang="es-ES" dirty="0" smtClean="0"/>
+              <a:rPr lang="es-ES" dirty="0"/>
               <a:t>En</a:t>
             </a:r>
             <a:r>
-              <a:rPr lang="es-ES" baseline="0" dirty="0" smtClean="0"/>
+              <a:rPr lang="es-ES" baseline="0" dirty="0"/>
               <a:t> esta diapositiva puede colocar contenidos y acompañarlos con una fotografía.</a:t>
             </a:r>
           </a:p>
@@ -1093,7 +1094,7 @@
               <a:buChar char="-"/>
             </a:pPr>
             <a:r>
-              <a:rPr lang="es-ES" baseline="0" dirty="0" smtClean="0"/>
+              <a:rPr lang="es-ES" baseline="0" dirty="0"/>
               <a:t>Los textos deben ir en azul (utilice el azul que aparece en la opciones de color de letra - -&gt; colores recientes) en tipografía Arial y justificados.</a:t>
             </a:r>
             <a:endParaRPr lang="es-ES" dirty="0"/>
@@ -1185,11 +1186,11 @@
               <a:buChar char="-"/>
             </a:pPr>
             <a:r>
-              <a:rPr lang="es-ES" dirty="0" smtClean="0"/>
+              <a:rPr lang="es-ES" dirty="0"/>
               <a:t>Utilice</a:t>
             </a:r>
             <a:r>
-              <a:rPr lang="es-ES" baseline="0" dirty="0" smtClean="0"/>
+              <a:rPr lang="es-ES" baseline="0" dirty="0"/>
               <a:t> esta diapositiva como introducción de una nueva sección de la presentación o para destacar una frase clave.</a:t>
             </a:r>
           </a:p>
@@ -1199,7 +1200,7 @@
               <a:buChar char="-"/>
             </a:pPr>
             <a:r>
-              <a:rPr lang="es-ES" baseline="0" dirty="0" smtClean="0"/>
+              <a:rPr lang="es-ES" baseline="0" dirty="0"/>
               <a:t>Al tener una foto de fondo los textos deben ser concisos.</a:t>
             </a:r>
           </a:p>
@@ -1209,7 +1210,7 @@
               <a:buChar char="-"/>
             </a:pPr>
             <a:r>
-              <a:rPr lang="es-ES" baseline="0" dirty="0" smtClean="0"/>
+              <a:rPr lang="es-ES" baseline="0" dirty="0"/>
               <a:t>Los textos debe ir en blanco utilizando la tipografía Arial con un tamaño mínimo de 16 puntos.</a:t>
             </a:r>
           </a:p>
@@ -1219,35 +1220,35 @@
               <a:buChar char="-"/>
             </a:pPr>
             <a:r>
-              <a:rPr lang="es-ES" baseline="0" dirty="0" smtClean="0"/>
+              <a:rPr lang="es-ES" baseline="0" dirty="0"/>
               <a:t>Esta diapositiva es completamente editable, usted puede borrar la imagen de fondo e insertar una nueva fotografía. Asegúrese que al momento de hacerlo, no borre el logo del SENA que aparece en la parte superior izquierda, ni tampoco borre el recuadro negro con transparencia del lado derecho ya que este es indispensable para garantizar lectura del texto sobre la imagen. Así mismo recuerde que al insertar la nueva fotografía debe darle en la opción: </a:t>
             </a:r>
             <a:r>
-              <a:rPr lang="es-ES" baseline="0" dirty="0" err="1" smtClean="0"/>
+              <a:rPr lang="es-ES" baseline="0" dirty="0" err="1"/>
               <a:t>click</a:t>
             </a:r>
             <a:r>
-              <a:rPr lang="es-ES" baseline="0" dirty="0" smtClean="0"/>
+              <a:rPr lang="es-ES" baseline="0" dirty="0"/>
               <a:t> </a:t>
             </a:r>
             <a:r>
-              <a:rPr lang="es-ES" baseline="0" smtClean="0"/>
+              <a:rPr lang="es-ES" baseline="0"/>
               <a:t>derecho </a:t>
             </a:r>
             <a:r>
-              <a:rPr lang="es-ES" baseline="0" smtClean="0">
+              <a:rPr lang="es-ES" baseline="0">
                 <a:sym typeface="Wingdings"/>
               </a:rPr>
               <a:t> </a:t>
             </a:r>
             <a:r>
-              <a:rPr lang="es-ES" baseline="0" dirty="0" smtClean="0">
+              <a:rPr lang="es-ES" baseline="0" dirty="0">
                 <a:sym typeface="Wingdings"/>
               </a:rPr>
               <a:t>enviar </a:t>
             </a:r>
             <a:r>
-              <a:rPr lang="es-ES" baseline="0" smtClean="0">
+              <a:rPr lang="es-ES" baseline="0">
                 <a:sym typeface="Wingdings"/>
               </a:rPr>
               <a:t>al fondo.</a:t>
@@ -1273,7 +1274,7 @@
           <a:p>
             <a:fld id="{88D09B62-7964-8A4C-9636-36CB120B29AE}" type="slidenum">
               <a:rPr lang="es-ES" smtClean="0"/>
-              <a:t>9</a:t>
+              <a:t>10</a:t>
             </a:fld>
             <a:endParaRPr lang="es-ES"/>
           </a:p>
@@ -1341,11 +1342,11 @@
               <a:buChar char="-"/>
             </a:pPr>
             <a:r>
-              <a:rPr lang="es-ES" dirty="0" smtClean="0"/>
+              <a:rPr lang="es-ES" dirty="0"/>
               <a:t>Utilice</a:t>
             </a:r>
             <a:r>
-              <a:rPr lang="es-ES" baseline="0" dirty="0" smtClean="0"/>
+              <a:rPr lang="es-ES" baseline="0" dirty="0"/>
               <a:t> esta diapositiva al final de su presentación</a:t>
             </a:r>
           </a:p>
@@ -1355,11 +1356,11 @@
               <a:buChar char="-"/>
             </a:pPr>
             <a:r>
-              <a:rPr lang="es-ES" baseline="0" smtClean="0"/>
+              <a:rPr lang="es-ES" baseline="0"/>
               <a:t>Esta </a:t>
             </a:r>
             <a:r>
-              <a:rPr lang="es-ES" baseline="0" dirty="0" smtClean="0"/>
+              <a:rPr lang="es-ES" baseline="0" dirty="0"/>
               <a:t>diapositiva no debe modificarse</a:t>
             </a:r>
             <a:endParaRPr lang="es-ES" dirty="0"/>
@@ -1383,7 +1384,7 @@
           <a:p>
             <a:fld id="{88D09B62-7964-8A4C-9636-36CB120B29AE}" type="slidenum">
               <a:rPr lang="es-ES" smtClean="0"/>
-              <a:t>10</a:t>
+              <a:t>11</a:t>
             </a:fld>
             <a:endParaRPr lang="es-ES"/>
           </a:p>
@@ -1504,7 +1505,7 @@
           </a:lstStyle>
           <a:p>
             <a:r>
-              <a:rPr lang="es-ES_tradnl" smtClean="0"/>
+              <a:rPr lang="es-ES_tradnl"/>
               <a:t>Clic para editar título</a:t>
             </a:r>
             <a:endParaRPr lang="es-ES"/>
@@ -1561,35 +1562,35 @@
           <a:p>
             <a:pPr lvl="0"/>
             <a:r>
-              <a:rPr lang="es-ES_tradnl" smtClean="0"/>
+              <a:rPr lang="es-ES_tradnl"/>
               <a:t>Haga clic para modificar el estilo de texto del patrón</a:t>
             </a:r>
           </a:p>
           <a:p>
             <a:pPr lvl="1"/>
             <a:r>
-              <a:rPr lang="es-ES_tradnl" smtClean="0"/>
+              <a:rPr lang="es-ES_tradnl"/>
               <a:t>Segundo nivel</a:t>
             </a:r>
           </a:p>
           <a:p>
             <a:pPr lvl="2"/>
             <a:r>
-              <a:rPr lang="es-ES_tradnl" smtClean="0"/>
+              <a:rPr lang="es-ES_tradnl"/>
               <a:t>Tercer nivel</a:t>
             </a:r>
           </a:p>
           <a:p>
             <a:pPr lvl="3"/>
             <a:r>
-              <a:rPr lang="es-ES_tradnl" smtClean="0"/>
+              <a:rPr lang="es-ES_tradnl"/>
               <a:t>Cuarto nivel</a:t>
             </a:r>
           </a:p>
           <a:p>
             <a:pPr lvl="4"/>
             <a:r>
-              <a:rPr lang="es-ES_tradnl" smtClean="0"/>
+              <a:rPr lang="es-ES_tradnl"/>
               <a:t>Quinto nivel</a:t>
             </a:r>
             <a:endParaRPr lang="es-ES"/>
@@ -1655,7 +1656,7 @@
           <a:p>
             <a:pPr lvl="0"/>
             <a:r>
-              <a:rPr lang="es-ES_tradnl" smtClean="0"/>
+              <a:rPr lang="es-ES_tradnl"/>
               <a:t>Haga clic para modificar el estilo de texto del patrón</a:t>
             </a:r>
           </a:p>
@@ -1678,7 +1679,7 @@
           <a:p>
             <a:fld id="{9315191A-A0A9-294A-9DF6-EE4FF7E8A271}" type="datetimeFigureOut">
               <a:rPr lang="es-ES" smtClean="0"/>
-              <a:t>20/09/2019</a:t>
+              <a:t>30/09/2019</a:t>
             </a:fld>
             <a:endParaRPr lang="es-ES"/>
           </a:p>
@@ -1781,7 +1782,7 @@
           </a:lstStyle>
           <a:p>
             <a:r>
-              <a:rPr lang="es-ES_tradnl" smtClean="0"/>
+              <a:rPr lang="es-ES_tradnl"/>
               <a:t>Clic para editar título</a:t>
             </a:r>
             <a:endParaRPr lang="es-ES"/>
@@ -1908,7 +1909,7 @@
           <a:p>
             <a:pPr lvl="0"/>
             <a:r>
-              <a:rPr lang="es-ES_tradnl" smtClean="0"/>
+              <a:rPr lang="es-ES_tradnl"/>
               <a:t>Haga clic para modificar el estilo de texto del patrón</a:t>
             </a:r>
           </a:p>
@@ -1931,7 +1932,7 @@
           <a:p>
             <a:fld id="{9315191A-A0A9-294A-9DF6-EE4FF7E8A271}" type="datetimeFigureOut">
               <a:rPr lang="es-ES" smtClean="0"/>
-              <a:t>20/09/2019</a:t>
+              <a:t>30/09/2019</a:t>
             </a:fld>
             <a:endParaRPr lang="es-ES"/>
           </a:p>
@@ -2025,7 +2026,7 @@
           <a:lstStyle/>
           <a:p>
             <a:r>
-              <a:rPr lang="es-ES_tradnl" smtClean="0"/>
+              <a:rPr lang="es-ES_tradnl"/>
               <a:t>Clic para editar título</a:t>
             </a:r>
             <a:endParaRPr lang="es-ES"/>
@@ -2049,35 +2050,35 @@
           <a:p>
             <a:pPr lvl="0"/>
             <a:r>
-              <a:rPr lang="es-ES_tradnl" smtClean="0"/>
+              <a:rPr lang="es-ES_tradnl"/>
               <a:t>Haga clic para modificar el estilo de texto del patrón</a:t>
             </a:r>
           </a:p>
           <a:p>
             <a:pPr lvl="1"/>
             <a:r>
-              <a:rPr lang="es-ES_tradnl" smtClean="0"/>
+              <a:rPr lang="es-ES_tradnl"/>
               <a:t>Segundo nivel</a:t>
             </a:r>
           </a:p>
           <a:p>
             <a:pPr lvl="2"/>
             <a:r>
-              <a:rPr lang="es-ES_tradnl" smtClean="0"/>
+              <a:rPr lang="es-ES_tradnl"/>
               <a:t>Tercer nivel</a:t>
             </a:r>
           </a:p>
           <a:p>
             <a:pPr lvl="3"/>
             <a:r>
-              <a:rPr lang="es-ES_tradnl" smtClean="0"/>
+              <a:rPr lang="es-ES_tradnl"/>
               <a:t>Cuarto nivel</a:t>
             </a:r>
           </a:p>
           <a:p>
             <a:pPr lvl="4"/>
             <a:r>
-              <a:rPr lang="es-ES_tradnl" smtClean="0"/>
+              <a:rPr lang="es-ES_tradnl"/>
               <a:t>Quinto nivel</a:t>
             </a:r>
             <a:endParaRPr lang="es-ES"/>
@@ -2101,7 +2102,7 @@
           <a:p>
             <a:fld id="{9315191A-A0A9-294A-9DF6-EE4FF7E8A271}" type="datetimeFigureOut">
               <a:rPr lang="es-ES" smtClean="0"/>
-              <a:t>20/09/2019</a:t>
+              <a:t>30/09/2019</a:t>
             </a:fld>
             <a:endParaRPr lang="es-ES"/>
           </a:p>
@@ -2200,7 +2201,7 @@
           <a:lstStyle/>
           <a:p>
             <a:r>
-              <a:rPr lang="es-ES_tradnl" smtClean="0"/>
+              <a:rPr lang="es-ES_tradnl"/>
               <a:t>Clic para editar título</a:t>
             </a:r>
             <a:endParaRPr lang="es-ES"/>
@@ -2229,35 +2230,35 @@
           <a:p>
             <a:pPr lvl="0"/>
             <a:r>
-              <a:rPr lang="es-ES_tradnl" smtClean="0"/>
+              <a:rPr lang="es-ES_tradnl"/>
               <a:t>Haga clic para modificar el estilo de texto del patrón</a:t>
             </a:r>
           </a:p>
           <a:p>
             <a:pPr lvl="1"/>
             <a:r>
-              <a:rPr lang="es-ES_tradnl" smtClean="0"/>
+              <a:rPr lang="es-ES_tradnl"/>
               <a:t>Segundo nivel</a:t>
             </a:r>
           </a:p>
           <a:p>
             <a:pPr lvl="2"/>
             <a:r>
-              <a:rPr lang="es-ES_tradnl" smtClean="0"/>
+              <a:rPr lang="es-ES_tradnl"/>
               <a:t>Tercer nivel</a:t>
             </a:r>
           </a:p>
           <a:p>
             <a:pPr lvl="3"/>
             <a:r>
-              <a:rPr lang="es-ES_tradnl" smtClean="0"/>
+              <a:rPr lang="es-ES_tradnl"/>
               <a:t>Cuarto nivel</a:t>
             </a:r>
           </a:p>
           <a:p>
             <a:pPr lvl="4"/>
             <a:r>
-              <a:rPr lang="es-ES_tradnl" smtClean="0"/>
+              <a:rPr lang="es-ES_tradnl"/>
               <a:t>Quinto nivel</a:t>
             </a:r>
             <a:endParaRPr lang="es-ES"/>
@@ -2281,7 +2282,7 @@
           <a:p>
             <a:fld id="{9315191A-A0A9-294A-9DF6-EE4FF7E8A271}" type="datetimeFigureOut">
               <a:rPr lang="es-ES" smtClean="0"/>
-              <a:t>20/09/2019</a:t>
+              <a:t>30/09/2019</a:t>
             </a:fld>
             <a:endParaRPr lang="es-ES"/>
           </a:p>
@@ -2654,7 +2655,7 @@
           </a:lstStyle>
           <a:p>
             <a:r>
-              <a:rPr lang="es-ES_tradnl" smtClean="0"/>
+              <a:rPr lang="es-ES_tradnl"/>
               <a:t>Clic para editar título</a:t>
             </a:r>
             <a:endParaRPr lang="es-ES"/>
@@ -2720,7 +2721,7 @@
           <a:p>
             <a:pPr lvl="0"/>
             <a:r>
-              <a:rPr lang="es-ES_tradnl" smtClean="0"/>
+              <a:rPr lang="es-ES_tradnl"/>
               <a:t>Haga clic para modificar el estilo de texto del patrón</a:t>
             </a:r>
           </a:p>
@@ -2776,35 +2777,35 @@
           <a:p>
             <a:pPr lvl="0"/>
             <a:r>
-              <a:rPr lang="es-ES_tradnl" smtClean="0"/>
+              <a:rPr lang="es-ES_tradnl"/>
               <a:t>Haga clic para modificar el estilo de texto del patrón</a:t>
             </a:r>
           </a:p>
           <a:p>
             <a:pPr lvl="1"/>
             <a:r>
-              <a:rPr lang="es-ES_tradnl" smtClean="0"/>
+              <a:rPr lang="es-ES_tradnl"/>
               <a:t>Segundo nivel</a:t>
             </a:r>
           </a:p>
           <a:p>
             <a:pPr lvl="2"/>
             <a:r>
-              <a:rPr lang="es-ES_tradnl" smtClean="0"/>
+              <a:rPr lang="es-ES_tradnl"/>
               <a:t>Tercer nivel</a:t>
             </a:r>
           </a:p>
           <a:p>
             <a:pPr lvl="3"/>
             <a:r>
-              <a:rPr lang="es-ES_tradnl" smtClean="0"/>
+              <a:rPr lang="es-ES_tradnl"/>
               <a:t>Cuarto nivel</a:t>
             </a:r>
           </a:p>
           <a:p>
             <a:pPr lvl="4"/>
             <a:r>
-              <a:rPr lang="es-ES_tradnl" smtClean="0"/>
+              <a:rPr lang="es-ES_tradnl"/>
               <a:t>Quinto nivel</a:t>
             </a:r>
             <a:endParaRPr lang="es-ES"/>
@@ -2870,7 +2871,7 @@
           <a:p>
             <a:pPr lvl="0"/>
             <a:r>
-              <a:rPr lang="es-ES_tradnl" smtClean="0"/>
+              <a:rPr lang="es-ES_tradnl"/>
               <a:t>Haga clic para modificar el estilo de texto del patrón</a:t>
             </a:r>
           </a:p>
@@ -2926,35 +2927,35 @@
           <a:p>
             <a:pPr lvl="0"/>
             <a:r>
-              <a:rPr lang="es-ES_tradnl" smtClean="0"/>
+              <a:rPr lang="es-ES_tradnl"/>
               <a:t>Haga clic para modificar el estilo de texto del patrón</a:t>
             </a:r>
           </a:p>
           <a:p>
             <a:pPr lvl="1"/>
             <a:r>
-              <a:rPr lang="es-ES_tradnl" smtClean="0"/>
+              <a:rPr lang="es-ES_tradnl"/>
               <a:t>Segundo nivel</a:t>
             </a:r>
           </a:p>
           <a:p>
             <a:pPr lvl="2"/>
             <a:r>
-              <a:rPr lang="es-ES_tradnl" smtClean="0"/>
+              <a:rPr lang="es-ES_tradnl"/>
               <a:t>Tercer nivel</a:t>
             </a:r>
           </a:p>
           <a:p>
             <a:pPr lvl="3"/>
             <a:r>
-              <a:rPr lang="es-ES_tradnl" smtClean="0"/>
+              <a:rPr lang="es-ES_tradnl"/>
               <a:t>Cuarto nivel</a:t>
             </a:r>
           </a:p>
           <a:p>
             <a:pPr lvl="4"/>
             <a:r>
-              <a:rPr lang="es-ES_tradnl" smtClean="0"/>
+              <a:rPr lang="es-ES_tradnl"/>
               <a:t>Quinto nivel</a:t>
             </a:r>
             <a:endParaRPr lang="es-ES"/>
@@ -2978,7 +2979,7 @@
           <a:p>
             <a:fld id="{9315191A-A0A9-294A-9DF6-EE4FF7E8A271}" type="datetimeFigureOut">
               <a:rPr lang="es-ES" smtClean="0"/>
-              <a:t>20/09/2019</a:t>
+              <a:t>30/09/2019</a:t>
             </a:fld>
             <a:endParaRPr lang="es-ES"/>
           </a:p>
@@ -3072,7 +3073,7 @@
           <a:lstStyle/>
           <a:p>
             <a:r>
-              <a:rPr lang="es-ES_tradnl" smtClean="0"/>
+              <a:rPr lang="es-ES_tradnl"/>
               <a:t>Clic para editar título</a:t>
             </a:r>
             <a:endParaRPr lang="es-ES"/>
@@ -3096,7 +3097,7 @@
           <a:p>
             <a:fld id="{9315191A-A0A9-294A-9DF6-EE4FF7E8A271}" type="datetimeFigureOut">
               <a:rPr lang="es-ES" smtClean="0"/>
-              <a:t>20/09/2019</a:t>
+              <a:t>30/09/2019</a:t>
             </a:fld>
             <a:endParaRPr lang="es-ES"/>
           </a:p>
@@ -3191,7 +3192,7 @@
           <a:p>
             <a:fld id="{9315191A-A0A9-294A-9DF6-EE4FF7E8A271}" type="datetimeFigureOut">
               <a:rPr lang="es-ES" smtClean="0"/>
-              <a:t>20/09/2019</a:t>
+              <a:t>30/09/2019</a:t>
             </a:fld>
             <a:endParaRPr lang="es-ES"/>
           </a:p>
@@ -3300,7 +3301,7 @@
           <a:lstStyle/>
           <a:p>
             <a:r>
-              <a:rPr lang="es-ES_tradnl" smtClean="0"/>
+              <a:rPr lang="es-ES_tradnl"/>
               <a:t>Clic para editar título</a:t>
             </a:r>
             <a:endParaRPr lang="es-ES"/>
@@ -3334,35 +3335,35 @@
           <a:p>
             <a:pPr lvl="0"/>
             <a:r>
-              <a:rPr lang="es-ES_tradnl" smtClean="0"/>
+              <a:rPr lang="es-ES_tradnl"/>
               <a:t>Haga clic para modificar el estilo de texto del patrón</a:t>
             </a:r>
           </a:p>
           <a:p>
             <a:pPr lvl="1"/>
             <a:r>
-              <a:rPr lang="es-ES_tradnl" smtClean="0"/>
+              <a:rPr lang="es-ES_tradnl"/>
               <a:t>Segundo nivel</a:t>
             </a:r>
           </a:p>
           <a:p>
             <a:pPr lvl="2"/>
             <a:r>
-              <a:rPr lang="es-ES_tradnl" smtClean="0"/>
+              <a:rPr lang="es-ES_tradnl"/>
               <a:t>Tercer nivel</a:t>
             </a:r>
           </a:p>
           <a:p>
             <a:pPr lvl="3"/>
             <a:r>
-              <a:rPr lang="es-ES_tradnl" smtClean="0"/>
+              <a:rPr lang="es-ES_tradnl"/>
               <a:t>Cuarto nivel</a:t>
             </a:r>
           </a:p>
           <a:p>
             <a:pPr lvl="4"/>
             <a:r>
-              <a:rPr lang="es-ES_tradnl" smtClean="0"/>
+              <a:rPr lang="es-ES_tradnl"/>
               <a:t>Quinto nivel</a:t>
             </a:r>
             <a:endParaRPr lang="es-ES"/>
@@ -3404,7 +3405,7 @@
           <a:p>
             <a:fld id="{9315191A-A0A9-294A-9DF6-EE4FF7E8A271}" type="datetimeFigureOut">
               <a:rPr lang="es-ES" smtClean="0"/>
-              <a:t>20/09/2019</a:t>
+              <a:t>30/09/2019</a:t>
             </a:fld>
             <a:endParaRPr lang="es-ES"/>
           </a:p>
@@ -3791,17 +3792,261 @@
   <p:clrMapOvr>
     <a:masterClrMapping/>
   </p:clrMapOvr>
-  <p:timing>
-    <p:tnLst>
-      <p:par>
-        <p:cTn id="1" dur="indefinite" restart="never" nodeType="tmRoot"/>
-      </p:par>
-    </p:tnLst>
-  </p:timing>
 </p:sld>
 </file>
 
 <file path=ppt/slides/slide10.xml><?xml version="1.0" encoding="utf-8"?>
+<p:sld xmlns:a="http://schemas.openxmlformats.org/drawingml/2006/main" xmlns:r="http://schemas.openxmlformats.org/officeDocument/2006/relationships" xmlns:p="http://schemas.openxmlformats.org/presentationml/2006/main">
+  <p:cSld>
+    <p:spTree>
+      <p:nvGrpSpPr>
+        <p:cNvPr id="1" name=""/>
+        <p:cNvGrpSpPr/>
+        <p:nvPr/>
+      </p:nvGrpSpPr>
+      <p:grpSpPr>
+        <a:xfrm>
+          <a:off x="0" y="0"/>
+          <a:ext cx="0" cy="0"/>
+          <a:chOff x="0" y="0"/>
+          <a:chExt cx="0" cy="0"/>
+        </a:xfrm>
+      </p:grpSpPr>
+      <p:pic>
+        <p:nvPicPr>
+          <p:cNvPr id="6" name="Imagen 5" descr="EDITORIAL3.jpg"/>
+          <p:cNvPicPr>
+            <a:picLocks noChangeAspect="1"/>
+          </p:cNvPicPr>
+          <p:nvPr/>
+        </p:nvPicPr>
+        <p:blipFill rotWithShape="1">
+          <a:blip r:embed="rId3">
+            <a:extLst>
+              <a:ext uri="{28A0092B-C50C-407E-A947-70E740481C1C}">
+                <a14:useLocalDpi xmlns:a14="http://schemas.microsoft.com/office/drawing/2010/main" val="0"/>
+              </a:ext>
+            </a:extLst>
+          </a:blip>
+          <a:srcRect t="14950"/>
+          <a:stretch/>
+        </p:blipFill>
+        <p:spPr>
+          <a:xfrm>
+            <a:off x="-40669" y="-42990"/>
+            <a:ext cx="9225338" cy="5229480"/>
+          </a:xfrm>
+          <a:prstGeom prst="rect">
+            <a:avLst/>
+          </a:prstGeom>
+        </p:spPr>
+      </p:pic>
+      <p:sp>
+        <p:nvSpPr>
+          <p:cNvPr id="3" name="Rectángulo 2"/>
+          <p:cNvSpPr/>
+          <p:nvPr/>
+        </p:nvSpPr>
+        <p:spPr>
+          <a:xfrm rot="16200000">
+            <a:off x="4596461" y="599207"/>
+            <a:ext cx="5302242" cy="3955513"/>
+          </a:xfrm>
+          <a:prstGeom prst="rect">
+            <a:avLst/>
+          </a:prstGeom>
+          <a:gradFill flip="none" rotWithShape="1">
+            <a:gsLst>
+              <a:gs pos="100000">
+                <a:schemeClr val="tx2">
+                  <a:alpha val="0"/>
+                </a:schemeClr>
+              </a:gs>
+              <a:gs pos="0">
+                <a:schemeClr val="tx1">
+                  <a:alpha val="46000"/>
+                </a:schemeClr>
+              </a:gs>
+            </a:gsLst>
+            <a:lin ang="16200000" scaled="0"/>
+            <a:tileRect/>
+          </a:gradFill>
+          <a:ln>
+            <a:noFill/>
+          </a:ln>
+        </p:spPr>
+        <p:style>
+          <a:lnRef idx="1">
+            <a:schemeClr val="accent1"/>
+          </a:lnRef>
+          <a:fillRef idx="3">
+            <a:schemeClr val="accent1"/>
+          </a:fillRef>
+          <a:effectRef idx="2">
+            <a:schemeClr val="accent1"/>
+          </a:effectRef>
+          <a:fontRef idx="minor">
+            <a:schemeClr val="lt1"/>
+          </a:fontRef>
+        </p:style>
+        <p:txBody>
+          <a:bodyPr rtlCol="0" anchor="ctr"/>
+          <a:lstStyle/>
+          <a:p>
+            <a:pPr algn="ctr"/>
+            <a:endParaRPr lang="es-ES"/>
+          </a:p>
+        </p:txBody>
+      </p:sp>
+      <p:sp>
+        <p:nvSpPr>
+          <p:cNvPr id="8" name="CuadroTexto 7"/>
+          <p:cNvSpPr txBox="1"/>
+          <p:nvPr/>
+        </p:nvSpPr>
+        <p:spPr>
+          <a:xfrm>
+            <a:off x="5888097" y="769998"/>
+            <a:ext cx="2780268" cy="461665"/>
+          </a:xfrm>
+          <a:prstGeom prst="rect">
+            <a:avLst/>
+          </a:prstGeom>
+          <a:noFill/>
+        </p:spPr>
+        <p:txBody>
+          <a:bodyPr wrap="square" rtlCol="0">
+            <a:spAutoFit/>
+          </a:bodyPr>
+          <a:lstStyle/>
+          <a:p>
+            <a:pPr algn="r"/>
+            <a:r>
+              <a:rPr lang="es-ES" sz="2400" b="1" dirty="0">
+                <a:solidFill>
+                  <a:schemeClr val="bg1"/>
+                </a:solidFill>
+                <a:latin typeface="Work sans"/>
+                <a:cs typeface="Work sans"/>
+              </a:rPr>
+              <a:t>FRASE</a:t>
+            </a:r>
+          </a:p>
+        </p:txBody>
+      </p:sp>
+      <p:sp>
+        <p:nvSpPr>
+          <p:cNvPr id="9" name="CuadroTexto 8"/>
+          <p:cNvSpPr txBox="1"/>
+          <p:nvPr/>
+        </p:nvSpPr>
+        <p:spPr>
+          <a:xfrm>
+            <a:off x="5269826" y="1598585"/>
+            <a:ext cx="3398540" cy="2677656"/>
+          </a:xfrm>
+          <a:prstGeom prst="rect">
+            <a:avLst/>
+          </a:prstGeom>
+          <a:noFill/>
+        </p:spPr>
+        <p:txBody>
+          <a:bodyPr wrap="square" rtlCol="0">
+            <a:spAutoFit/>
+          </a:bodyPr>
+          <a:lstStyle/>
+          <a:p>
+            <a:pPr algn="r"/>
+            <a:r>
+              <a:rPr lang="es-ES" sz="2400" dirty="0">
+                <a:solidFill>
+                  <a:schemeClr val="bg1"/>
+                </a:solidFill>
+                <a:latin typeface="Work sans"/>
+                <a:cs typeface="Work sans"/>
+              </a:rPr>
+              <a:t>El</a:t>
+            </a:r>
+            <a:r>
+              <a:rPr lang="es-ES" sz="2400" b="1" dirty="0">
+                <a:solidFill>
+                  <a:schemeClr val="bg1"/>
+                </a:solidFill>
+                <a:latin typeface="Work sans"/>
+                <a:cs typeface="Work sans"/>
+              </a:rPr>
+              <a:t> éxito no se trata de tener suerte , la suerte la construyes con esfuerzo y dedicación.</a:t>
+            </a:r>
+          </a:p>
+        </p:txBody>
+      </p:sp>
+      <p:pic>
+        <p:nvPicPr>
+          <p:cNvPr id="11" name="Imagen 10"/>
+          <p:cNvPicPr>
+            <a:picLocks noChangeAspect="1"/>
+          </p:cNvPicPr>
+          <p:nvPr/>
+        </p:nvPicPr>
+        <p:blipFill>
+          <a:blip r:embed="rId4"/>
+          <a:stretch>
+            <a:fillRect/>
+          </a:stretch>
+        </p:blipFill>
+        <p:spPr>
+          <a:xfrm flipV="1">
+            <a:off x="7940706" y="1431751"/>
+            <a:ext cx="642357" cy="41563"/>
+          </a:xfrm>
+          <a:prstGeom prst="rect">
+            <a:avLst/>
+          </a:prstGeom>
+        </p:spPr>
+      </p:pic>
+      <p:pic>
+        <p:nvPicPr>
+          <p:cNvPr id="16" name="Imagen 15" descr="naranja.png"/>
+          <p:cNvPicPr>
+            <a:picLocks noChangeAspect="1"/>
+          </p:cNvPicPr>
+          <p:nvPr/>
+        </p:nvPicPr>
+        <p:blipFill rotWithShape="1">
+          <a:blip r:embed="rId5">
+            <a:extLst>
+              <a:ext uri="{28A0092B-C50C-407E-A947-70E740481C1C}">
+                <a14:useLocalDpi xmlns:a14="http://schemas.microsoft.com/office/drawing/2010/main" val="0"/>
+              </a:ext>
+            </a:extLst>
+          </a:blip>
+          <a:srcRect l="21032" t="19996" r="22452" b="17818"/>
+          <a:stretch/>
+        </p:blipFill>
+        <p:spPr>
+          <a:xfrm>
+            <a:off x="297204" y="290458"/>
+            <a:ext cx="601377" cy="603694"/>
+          </a:xfrm>
+          <a:prstGeom prst="rect">
+            <a:avLst/>
+          </a:prstGeom>
+        </p:spPr>
+      </p:pic>
+    </p:spTree>
+    <p:extLst>
+      <p:ext uri="{BB962C8B-B14F-4D97-AF65-F5344CB8AC3E}">
+        <p14:creationId xmlns:p14="http://schemas.microsoft.com/office/powerpoint/2010/main" val="47339120"/>
+      </p:ext>
+    </p:extLst>
+  </p:cSld>
+  <p:clrMapOvr>
+    <a:masterClrMapping/>
+  </p:clrMapOvr>
+</p:sld>
+</file>
+
+<file path=ppt/slides/slide11.xml><?xml version="1.0" encoding="utf-8"?>
 <p:sld xmlns:a="http://schemas.openxmlformats.org/drawingml/2006/main" xmlns:r="http://schemas.openxmlformats.org/officeDocument/2006/relationships" xmlns:p="http://schemas.openxmlformats.org/presentationml/2006/main">
   <p:cSld>
     <p:bg>
@@ -3839,13 +4084,6 @@
   <p:clrMapOvr>
     <a:masterClrMapping/>
   </p:clrMapOvr>
-  <p:timing>
-    <p:tnLst>
-      <p:par>
-        <p:cTn id="1" dur="indefinite" restart="never" nodeType="tmRoot"/>
-      </p:par>
-    </p:tnLst>
-  </p:timing>
 </p:sld>
 </file>
 
@@ -3889,7 +4127,7 @@
           <a:lstStyle/>
           <a:p>
             <a:r>
-              <a:rPr lang="es-ES" sz="2400" dirty="0" smtClean="0">
+              <a:rPr lang="es-ES" sz="2400" dirty="0">
                 <a:solidFill>
                   <a:schemeClr val="bg1"/>
                 </a:solidFill>
@@ -3898,13 +4136,6 @@
               </a:rPr>
               <a:t>Strong Inventory</a:t>
             </a:r>
-            <a:endParaRPr lang="es-ES" sz="2400" dirty="0">
-              <a:solidFill>
-                <a:schemeClr val="bg1"/>
-              </a:solidFill>
-              <a:latin typeface="Arial"/>
-              <a:cs typeface="Arial"/>
-            </a:endParaRPr>
           </a:p>
         </p:txBody>
       </p:sp>
@@ -3931,7 +4162,7 @@
           <a:lstStyle/>
           <a:p>
             <a:r>
-              <a:rPr lang="es-ES" dirty="0" smtClean="0">
+              <a:rPr lang="es-ES" dirty="0">
                 <a:solidFill>
                   <a:schemeClr val="bg1"/>
                 </a:solidFill>
@@ -3940,13 +4171,6 @@
               </a:rPr>
               <a:t>Project</a:t>
             </a:r>
-            <a:endParaRPr lang="es-ES" dirty="0">
-              <a:solidFill>
-                <a:schemeClr val="bg1"/>
-              </a:solidFill>
-              <a:latin typeface="Arial"/>
-              <a:cs typeface="Arial"/>
-            </a:endParaRPr>
           </a:p>
         </p:txBody>
       </p:sp>
@@ -4009,7 +4233,7 @@
           <a:lstStyle/>
           <a:p>
             <a:r>
-              <a:rPr lang="es-ES" dirty="0" smtClean="0">
+              <a:rPr lang="es-ES" dirty="0">
                 <a:solidFill>
                   <a:schemeClr val="bg1"/>
                 </a:solidFill>
@@ -4018,13 +4242,6 @@
               </a:rPr>
               <a:t>MR</a:t>
             </a:r>
-            <a:endParaRPr lang="es-ES" dirty="0">
-              <a:solidFill>
-                <a:schemeClr val="bg1"/>
-              </a:solidFill>
-              <a:latin typeface="Arial"/>
-              <a:cs typeface="Arial"/>
-            </a:endParaRPr>
           </a:p>
         </p:txBody>
       </p:sp>
@@ -4087,7 +4304,7 @@
           <a:lstStyle/>
           <a:p>
             <a:r>
-              <a:rPr lang="es-ES" dirty="0" smtClean="0">
+              <a:rPr lang="es-ES" dirty="0">
                 <a:solidFill>
                   <a:schemeClr val="bg1"/>
                 </a:solidFill>
@@ -4096,13 +4313,6 @@
               </a:rPr>
               <a:t>Mockups</a:t>
             </a:r>
-            <a:endParaRPr lang="es-ES" dirty="0">
-              <a:solidFill>
-                <a:schemeClr val="bg1"/>
-              </a:solidFill>
-              <a:latin typeface="Arial"/>
-              <a:cs typeface="Arial"/>
-            </a:endParaRPr>
           </a:p>
         </p:txBody>
       </p:sp>
@@ -4165,7 +4375,7 @@
           <a:lstStyle/>
           <a:p>
             <a:r>
-              <a:rPr lang="es-ES" dirty="0" smtClean="0">
+              <a:rPr lang="es-ES" dirty="0">
                 <a:solidFill>
                   <a:schemeClr val="bg1"/>
                 </a:solidFill>
@@ -4174,13 +4384,6 @@
               </a:rPr>
               <a:t>Diagrama de clases</a:t>
             </a:r>
-            <a:endParaRPr lang="es-ES" dirty="0">
-              <a:solidFill>
-                <a:schemeClr val="bg1"/>
-              </a:solidFill>
-              <a:latin typeface="Arial"/>
-              <a:cs typeface="Arial"/>
-            </a:endParaRPr>
           </a:p>
         </p:txBody>
       </p:sp>
@@ -4207,7 +4410,7 @@
           <a:lstStyle/>
           <a:p>
             <a:r>
-              <a:rPr lang="es-ES" dirty="0" err="1" smtClean="0">
+              <a:rPr lang="es-ES" dirty="0" err="1">
                 <a:solidFill>
                   <a:schemeClr val="bg1"/>
                 </a:solidFill>
@@ -4285,7 +4488,7 @@
           <a:lstStyle/>
           <a:p>
             <a:r>
-              <a:rPr lang="es-ES" dirty="0" smtClean="0">
+              <a:rPr lang="es-ES" dirty="0">
                 <a:solidFill>
                   <a:schemeClr val="bg1"/>
                 </a:solidFill>
@@ -4294,13 +4497,6 @@
               </a:rPr>
               <a:t>Diccionario de datos</a:t>
             </a:r>
-            <a:endParaRPr lang="es-ES" dirty="0">
-              <a:solidFill>
-                <a:schemeClr val="bg1"/>
-              </a:solidFill>
-              <a:latin typeface="Arial"/>
-              <a:cs typeface="Arial"/>
-            </a:endParaRPr>
           </a:p>
         </p:txBody>
       </p:sp>
@@ -4350,13 +4546,6 @@
   <p:clrMapOvr>
     <a:masterClrMapping/>
   </p:clrMapOvr>
-  <p:timing>
-    <p:tnLst>
-      <p:par>
-        <p:cTn id="1" dur="indefinite" restart="never" nodeType="tmRoot"/>
-      </p:par>
-    </p:tnLst>
-  </p:timing>
 </p:sld>
 </file>
 
@@ -4427,18 +4616,13 @@
           <a:lstStyle/>
           <a:p>
             <a:r>
-              <a:rPr lang="es-ES" sz="2800" dirty="0" smtClean="0">
+              <a:rPr lang="es-ES" sz="2800" dirty="0">
                 <a:solidFill>
                   <a:srgbClr val="274FB2"/>
                 </a:solidFill>
               </a:rPr>
               <a:t>Strong Inventory</a:t>
             </a:r>
-            <a:endParaRPr lang="es-ES" sz="2800" dirty="0">
-              <a:solidFill>
-                <a:srgbClr val="274FB2"/>
-              </a:solidFill>
-            </a:endParaRPr>
           </a:p>
         </p:txBody>
       </p:sp>
@@ -4465,35 +4649,14 @@
           <a:lstStyle/>
           <a:p>
             <a:pPr algn="just"/>
-            <a:r>
-              <a:rPr lang="es-CO" sz="1400" dirty="0" smtClean="0">
-                <a:solidFill>
-                  <a:srgbClr val="274FB2"/>
-                </a:solidFill>
-              </a:rPr>
-              <a:t>Strong Inventory es un sistema de gestión de inventarios dedicado a la solución del problema que </a:t>
-            </a:r>
             <a:r>
               <a:rPr lang="es-CO" sz="1400" dirty="0">
                 <a:solidFill>
                   <a:srgbClr val="274FB2"/>
                 </a:solidFill>
               </a:rPr>
-              <a:t>s</a:t>
-            </a:r>
-            <a:r>
-              <a:rPr lang="es-CO" sz="1400" dirty="0" smtClean="0">
-                <a:solidFill>
-                  <a:srgbClr val="274FB2"/>
-                </a:solidFill>
-              </a:rPr>
-              <a:t>e presenta actualmente en el colegio Nidia Quintero en donde se lleva un control sobre el stock que maneja el colegio, con esto en mente el sistema Strong Inventory servirá para llevar un control de las entradas y salidas de los productos(Stock) como también poder generar reportes sobre los productos.</a:t>
-            </a:r>
-            <a:endParaRPr lang="es-CO" sz="1400" dirty="0">
-              <a:solidFill>
-                <a:srgbClr val="274FB2"/>
-              </a:solidFill>
-            </a:endParaRPr>
+              <a:t>Strong Inventory es un sistema de gestión de inventarios dedicado a la solución del problema que se presenta actualmente en el colegio Nidia Quintero en donde se lleva un control sobre el stock que maneja el colegio, con esto en mente el sistema Strong Inventory servirá para llevar un control de las entradas y salidas de los productos(Stock) como también poder generar reportes sobre los productos.</a:t>
+            </a:r>
           </a:p>
         </p:txBody>
       </p:sp>
@@ -4507,13 +4670,6 @@
   <p:clrMapOvr>
     <a:masterClrMapping/>
   </p:clrMapOvr>
-  <p:timing>
-    <p:tnLst>
-      <p:par>
-        <p:cTn id="1" dur="indefinite" restart="never" nodeType="tmRoot"/>
-      </p:par>
-    </p:tnLst>
-  </p:timing>
 </p:sld>
 </file>
 
@@ -4557,18 +4713,13 @@
           <a:lstStyle/>
           <a:p>
             <a:r>
-              <a:rPr lang="es-ES" sz="2800" dirty="0" smtClean="0">
+              <a:rPr lang="es-ES" sz="2800" dirty="0">
                 <a:solidFill>
                   <a:srgbClr val="274FB2"/>
                 </a:solidFill>
               </a:rPr>
               <a:t>Project</a:t>
             </a:r>
-            <a:endParaRPr lang="es-ES" sz="2800" dirty="0">
-              <a:solidFill>
-                <a:srgbClr val="274FB2"/>
-              </a:solidFill>
-            </a:endParaRPr>
           </a:p>
         </p:txBody>
       </p:sp>
@@ -4596,18 +4747,13 @@
           <a:p>
             <a:pPr algn="just"/>
             <a:r>
-              <a:rPr lang="es-CO" sz="2400" dirty="0" smtClean="0">
+              <a:rPr lang="es-CO" sz="2400" dirty="0">
                 <a:solidFill>
                   <a:srgbClr val="274FB2"/>
                 </a:solidFill>
               </a:rPr>
               <a:t>Project es un programa que ofrece Microsoft para poder llevar una visualización a futuro del un proyecto, en el se puede crear un cronograma, se puede asignar las tareas a una persona especifica y otras funciones, de igual forma Project ofrece una visualización de como se desarrollaran las tareas con el diagrama de Gantt.</a:t>
             </a:r>
-            <a:endParaRPr lang="es-CO" sz="2400" dirty="0">
-              <a:solidFill>
-                <a:srgbClr val="274FB2"/>
-              </a:solidFill>
-            </a:endParaRPr>
           </a:p>
         </p:txBody>
       </p:sp>
@@ -4635,6 +4781,56 @@
           </a:prstGeom>
         </p:spPr>
       </p:pic>
+      <p:sp>
+        <p:nvSpPr>
+          <p:cNvPr id="4" name="Elipse 3">
+            <a:extLst>
+              <a:ext uri="{FF2B5EF4-FFF2-40B4-BE49-F238E27FC236}">
+                <a16:creationId xmlns:a16="http://schemas.microsoft.com/office/drawing/2014/main" id="{9B2978EA-A4EC-48BD-9B94-AC836580AF00}"/>
+              </a:ext>
+            </a:extLst>
+          </p:cNvPr>
+          <p:cNvSpPr/>
+          <p:nvPr/>
+        </p:nvSpPr>
+        <p:spPr>
+          <a:xfrm>
+            <a:off x="7761768" y="4579984"/>
+            <a:ext cx="1212112" cy="422644"/>
+          </a:xfrm>
+          <a:prstGeom prst="ellipse">
+            <a:avLst/>
+          </a:prstGeom>
+        </p:spPr>
+        <p:style>
+          <a:lnRef idx="1">
+            <a:schemeClr val="accent1"/>
+          </a:lnRef>
+          <a:fillRef idx="3">
+            <a:schemeClr val="accent1"/>
+          </a:fillRef>
+          <a:effectRef idx="2">
+            <a:schemeClr val="accent1"/>
+          </a:effectRef>
+          <a:fontRef idx="minor">
+            <a:schemeClr val="lt1"/>
+          </a:fontRef>
+        </p:style>
+        <p:txBody>
+          <a:bodyPr rtlCol="0" anchor="ctr"/>
+          <a:lstStyle/>
+          <a:p>
+            <a:pPr algn="ctr"/>
+            <a:r>
+              <a:rPr lang="es-CO" dirty="0">
+                <a:hlinkClick r:id="rId4" action="ppaction://hlinkfile"/>
+              </a:rPr>
+              <a:t>Project</a:t>
+            </a:r>
+            <a:endParaRPr lang="es-CO" dirty="0"/>
+          </a:p>
+        </p:txBody>
+      </p:sp>
     </p:spTree>
     <p:extLst>
       <p:ext uri="{BB962C8B-B14F-4D97-AF65-F5344CB8AC3E}">
@@ -4645,13 +4841,6 @@
   <p:clrMapOvr>
     <a:masterClrMapping/>
   </p:clrMapOvr>
-  <p:timing>
-    <p:tnLst>
-      <p:par>
-        <p:cTn id="1" dur="indefinite" restart="never" nodeType="tmRoot"/>
-      </p:par>
-    </p:tnLst>
-  </p:timing>
 </p:sld>
 </file>
 
@@ -4719,7 +4908,7 @@
           <a:lstStyle/>
           <a:p>
             <a:r>
-              <a:rPr lang="es-ES" sz="2800" dirty="0" smtClean="0">
+              <a:rPr lang="es-ES" sz="2800" dirty="0">
                 <a:solidFill>
                   <a:srgbClr val="274FB2"/>
                 </a:solidFill>
@@ -4730,7 +4919,7 @@
           </a:p>
           <a:p>
             <a:r>
-              <a:rPr lang="es-ES" sz="2800" dirty="0" smtClean="0">
+              <a:rPr lang="es-ES" sz="2800" dirty="0">
                 <a:solidFill>
                   <a:srgbClr val="274FB2"/>
                 </a:solidFill>
@@ -4738,12 +4927,6 @@
               </a:rPr>
               <a:t>Relacional</a:t>
             </a:r>
-            <a:endParaRPr lang="es-ES" sz="2800" dirty="0">
-              <a:solidFill>
-                <a:srgbClr val="274FB2"/>
-              </a:solidFill>
-              <a:latin typeface="Work Sans" panose="00000500000000000000" pitchFamily="2" charset="0"/>
-            </a:endParaRPr>
           </a:p>
         </p:txBody>
       </p:sp>
@@ -4771,18 +4954,63 @@
           <a:p>
             <a:pPr algn="just"/>
             <a:r>
-              <a:rPr lang="es-CO" sz="2400" dirty="0" smtClean="0">
+              <a:rPr lang="es-CO" sz="2400" dirty="0">
                 <a:solidFill>
                   <a:srgbClr val="274FB2"/>
                 </a:solidFill>
               </a:rPr>
               <a:t>El modelo relacional es un esquema que se sigue para poder desarrollar una base de datos optima y que sea enfocada en el propósito del proyecto.</a:t>
             </a:r>
-            <a:endParaRPr lang="es-CO" sz="2400" dirty="0">
-              <a:solidFill>
-                <a:srgbClr val="274FB2"/>
-              </a:solidFill>
-            </a:endParaRPr>
+          </a:p>
+        </p:txBody>
+      </p:sp>
+      <p:sp>
+        <p:nvSpPr>
+          <p:cNvPr id="8" name="Elipse 7">
+            <a:extLst>
+              <a:ext uri="{FF2B5EF4-FFF2-40B4-BE49-F238E27FC236}">
+                <a16:creationId xmlns:a16="http://schemas.microsoft.com/office/drawing/2014/main" id="{5A7650BA-63CD-45E6-82DE-E48E0102C982}"/>
+              </a:ext>
+            </a:extLst>
+          </p:cNvPr>
+          <p:cNvSpPr/>
+          <p:nvPr/>
+        </p:nvSpPr>
+        <p:spPr>
+          <a:xfrm>
+            <a:off x="7761768" y="4579984"/>
+            <a:ext cx="1212112" cy="422644"/>
+          </a:xfrm>
+          <a:prstGeom prst="ellipse">
+            <a:avLst/>
+          </a:prstGeom>
+        </p:spPr>
+        <p:style>
+          <a:lnRef idx="1">
+            <a:schemeClr val="accent1"/>
+          </a:lnRef>
+          <a:fillRef idx="3">
+            <a:schemeClr val="accent1"/>
+          </a:fillRef>
+          <a:effectRef idx="2">
+            <a:schemeClr val="accent1"/>
+          </a:effectRef>
+          <a:fontRef idx="minor">
+            <a:schemeClr val="lt1"/>
+          </a:fontRef>
+        </p:style>
+        <p:txBody>
+          <a:bodyPr rtlCol="0" anchor="ctr"/>
+          <a:lstStyle/>
+          <a:p>
+            <a:pPr algn="ctr"/>
+            <a:r>
+              <a:rPr lang="es-CO" dirty="0">
+                <a:hlinkClick r:id="rId4" action="ppaction://hlinkfile"/>
+              </a:rPr>
+              <a:t>MR</a:t>
+            </a:r>
+            <a:endParaRPr lang="es-CO" dirty="0"/>
           </a:p>
         </p:txBody>
       </p:sp>
@@ -4796,13 +5024,6 @@
   <p:clrMapOvr>
     <a:masterClrMapping/>
   </p:clrMapOvr>
-  <p:timing>
-    <p:tnLst>
-      <p:par>
-        <p:cTn id="1" dur="indefinite" restart="never" nodeType="tmRoot"/>
-      </p:par>
-    </p:tnLst>
-  </p:timing>
 </p:sld>
 </file>
 
@@ -4846,7 +5067,7 @@
           <a:lstStyle/>
           <a:p>
             <a:r>
-              <a:rPr lang="es-ES" sz="2800" dirty="0" smtClean="0">
+              <a:rPr lang="es-ES" sz="2800" dirty="0">
                 <a:solidFill>
                   <a:srgbClr val="274FB2"/>
                 </a:solidFill>
@@ -4854,12 +5075,6 @@
               </a:rPr>
               <a:t>Mockups</a:t>
             </a:r>
-            <a:endParaRPr lang="es-ES" sz="2800" dirty="0">
-              <a:solidFill>
-                <a:srgbClr val="274FB2"/>
-              </a:solidFill>
-              <a:latin typeface="Work Sans" panose="00000500000000000000" pitchFamily="2" charset="0"/>
-            </a:endParaRPr>
           </a:p>
         </p:txBody>
       </p:sp>
@@ -4911,7 +5126,7 @@
           <a:p>
             <a:pPr algn="just"/>
             <a:r>
-              <a:rPr lang="es-CO" sz="2400" dirty="0" smtClean="0">
+              <a:rPr lang="es-CO" sz="2400" dirty="0">
                 <a:solidFill>
                   <a:srgbClr val="274FB2"/>
                 </a:solidFill>
@@ -4919,25 +5134,70 @@
               <a:t>Los mockups son un prototipo del como se vera la interfaz grafica y de como funcionara el sistema que se esta creando, de igual forma se puede considerar que son un boceto para guiarse en la construcción de la herramienta.</a:t>
             </a:r>
             <a:br>
-              <a:rPr lang="es-CO" sz="2400" dirty="0" smtClean="0">
+              <a:rPr lang="es-CO" sz="2400" dirty="0">
                 <a:solidFill>
                   <a:srgbClr val="274FB2"/>
                 </a:solidFill>
               </a:rPr>
             </a:br>
             <a:r>
-              <a:rPr lang="es-CO" sz="2400" dirty="0" smtClean="0">
+              <a:rPr lang="es-CO" sz="2400" dirty="0">
                 <a:solidFill>
                   <a:srgbClr val="274FB2"/>
                 </a:solidFill>
               </a:rPr>
               <a:t>Los mockups también sirven para representar las características del sistema.</a:t>
             </a:r>
-            <a:endParaRPr lang="es-CO" sz="2400" dirty="0">
-              <a:solidFill>
-                <a:srgbClr val="274FB2"/>
-              </a:solidFill>
-            </a:endParaRPr>
+          </a:p>
+        </p:txBody>
+      </p:sp>
+      <p:sp>
+        <p:nvSpPr>
+          <p:cNvPr id="7" name="Elipse 6">
+            <a:extLst>
+              <a:ext uri="{FF2B5EF4-FFF2-40B4-BE49-F238E27FC236}">
+                <a16:creationId xmlns:a16="http://schemas.microsoft.com/office/drawing/2014/main" id="{5A798C5D-466B-48DB-BFD4-9553E6446AAF}"/>
+              </a:ext>
+            </a:extLst>
+          </p:cNvPr>
+          <p:cNvSpPr/>
+          <p:nvPr/>
+        </p:nvSpPr>
+        <p:spPr>
+          <a:xfrm>
+            <a:off x="7442791" y="4579984"/>
+            <a:ext cx="1531089" cy="422644"/>
+          </a:xfrm>
+          <a:prstGeom prst="ellipse">
+            <a:avLst/>
+          </a:prstGeom>
+        </p:spPr>
+        <p:style>
+          <a:lnRef idx="1">
+            <a:schemeClr val="accent1"/>
+          </a:lnRef>
+          <a:fillRef idx="3">
+            <a:schemeClr val="accent1"/>
+          </a:fillRef>
+          <a:effectRef idx="2">
+            <a:schemeClr val="accent1"/>
+          </a:effectRef>
+          <a:fontRef idx="minor">
+            <a:schemeClr val="lt1"/>
+          </a:fontRef>
+        </p:style>
+        <p:txBody>
+          <a:bodyPr rtlCol="0" anchor="ctr"/>
+          <a:lstStyle/>
+          <a:p>
+            <a:pPr algn="ctr"/>
+            <a:r>
+              <a:rPr lang="es-CO" dirty="0">
+                <a:hlinkClick r:id="rId4" action="ppaction://hlinkfile"/>
+              </a:rPr>
+              <a:t>Mockups</a:t>
+            </a:r>
+            <a:endParaRPr lang="es-CO" dirty="0"/>
           </a:p>
         </p:txBody>
       </p:sp>
@@ -4951,13 +5211,6 @@
   <p:clrMapOvr>
     <a:masterClrMapping/>
   </p:clrMapOvr>
-  <p:timing>
-    <p:tnLst>
-      <p:par>
-        <p:cTn id="1" dur="indefinite" restart="never" nodeType="tmRoot"/>
-      </p:par>
-    </p:tnLst>
-  </p:timing>
 </p:sld>
 </file>
 
@@ -5002,7 +5255,7 @@
           <a:p>
             <a:pPr algn="ctr"/>
             <a:r>
-              <a:rPr lang="es-ES" sz="2800" dirty="0" smtClean="0">
+              <a:rPr lang="es-ES" sz="2800" dirty="0">
                 <a:solidFill>
                   <a:srgbClr val="274FB2"/>
                 </a:solidFill>
@@ -5014,7 +5267,7 @@
           <a:p>
             <a:pPr algn="ctr"/>
             <a:r>
-              <a:rPr lang="es-ES" sz="2800" dirty="0" smtClean="0">
+              <a:rPr lang="es-ES" sz="2800" dirty="0">
                 <a:solidFill>
                   <a:srgbClr val="274FB2"/>
                 </a:solidFill>
@@ -5022,12 +5275,6 @@
               </a:rPr>
               <a:t>clases</a:t>
             </a:r>
-            <a:endParaRPr lang="es-ES" sz="2800" dirty="0">
-              <a:solidFill>
-                <a:srgbClr val="274FB2"/>
-              </a:solidFill>
-              <a:latin typeface="Work Sans" panose="00000500000000000000" pitchFamily="2" charset="0"/>
-            </a:endParaRPr>
           </a:p>
         </p:txBody>
       </p:sp>
@@ -5055,18 +5302,13 @@
           <a:p>
             <a:pPr algn="just"/>
             <a:r>
-              <a:rPr lang="es-CO" sz="2400" dirty="0" smtClean="0">
+              <a:rPr lang="es-CO" sz="2400" dirty="0">
                 <a:solidFill>
                   <a:srgbClr val="274FB2"/>
                 </a:solidFill>
               </a:rPr>
               <a:t>Los diagrama de clases sirven para representar el funcionamiento que tendrá el sistema, mostrando sus características, los métodos y las relaciones entre cada clases.</a:t>
             </a:r>
-            <a:endParaRPr lang="es-CO" sz="2400" dirty="0">
-              <a:solidFill>
-                <a:srgbClr val="274FB2"/>
-              </a:solidFill>
-            </a:endParaRPr>
           </a:p>
         </p:txBody>
       </p:sp>
@@ -5094,6 +5336,53 @@
           </a:prstGeom>
         </p:spPr>
       </p:pic>
+      <p:sp>
+        <p:nvSpPr>
+          <p:cNvPr id="5" name="Elipse 4">
+            <a:extLst>
+              <a:ext uri="{FF2B5EF4-FFF2-40B4-BE49-F238E27FC236}">
+                <a16:creationId xmlns:a16="http://schemas.microsoft.com/office/drawing/2014/main" id="{4F63785F-76FA-46EC-850B-01E5954E5248}"/>
+              </a:ext>
+            </a:extLst>
+          </p:cNvPr>
+          <p:cNvSpPr/>
+          <p:nvPr/>
+        </p:nvSpPr>
+        <p:spPr>
+          <a:xfrm>
+            <a:off x="7761768" y="4579984"/>
+            <a:ext cx="1212112" cy="422644"/>
+          </a:xfrm>
+          <a:prstGeom prst="ellipse">
+            <a:avLst/>
+          </a:prstGeom>
+        </p:spPr>
+        <p:style>
+          <a:lnRef idx="1">
+            <a:schemeClr val="accent1"/>
+          </a:lnRef>
+          <a:fillRef idx="3">
+            <a:schemeClr val="accent1"/>
+          </a:fillRef>
+          <a:effectRef idx="2">
+            <a:schemeClr val="accent1"/>
+          </a:effectRef>
+          <a:fontRef idx="minor">
+            <a:schemeClr val="lt1"/>
+          </a:fontRef>
+        </p:style>
+        <p:txBody>
+          <a:bodyPr rtlCol="0" anchor="ctr"/>
+          <a:lstStyle/>
+          <a:p>
+            <a:pPr algn="ctr"/>
+            <a:r>
+              <a:rPr lang="es-CO" dirty="0"/>
+              <a:t>DC</a:t>
+            </a:r>
+          </a:p>
+        </p:txBody>
+      </p:sp>
     </p:spTree>
     <p:extLst>
       <p:ext uri="{BB962C8B-B14F-4D97-AF65-F5344CB8AC3E}">
@@ -5124,122 +5413,181 @@
           <a:chExt cx="0" cy="0"/>
         </a:xfrm>
       </p:grpSpPr>
+      <p:sp>
+        <p:nvSpPr>
+          <p:cNvPr id="2" name="CuadroTexto 1">
+            <a:extLst>
+              <a:ext uri="{FF2B5EF4-FFF2-40B4-BE49-F238E27FC236}">
+                <a16:creationId xmlns:a16="http://schemas.microsoft.com/office/drawing/2014/main" id="{9040B56C-37F0-4349-B586-38825510211C}"/>
+              </a:ext>
+            </a:extLst>
+          </p:cNvPr>
+          <p:cNvSpPr txBox="1"/>
+          <p:nvPr/>
+        </p:nvSpPr>
+        <p:spPr>
+          <a:xfrm>
+            <a:off x="5774894" y="296879"/>
+            <a:ext cx="2137765" cy="954107"/>
+          </a:xfrm>
+          <a:prstGeom prst="rect">
+            <a:avLst/>
+          </a:prstGeom>
+          <a:noFill/>
+        </p:spPr>
+        <p:txBody>
+          <a:bodyPr wrap="none" rtlCol="0">
+            <a:spAutoFit/>
+          </a:bodyPr>
+          <a:lstStyle/>
+          <a:p>
+            <a:pPr algn="ctr"/>
+            <a:r>
+              <a:rPr lang="es-ES" sz="2800" dirty="0">
+                <a:solidFill>
+                  <a:srgbClr val="274FB2"/>
+                </a:solidFill>
+                <a:latin typeface="Work Sans" panose="00000500000000000000" pitchFamily="2" charset="0"/>
+              </a:rPr>
+              <a:t>Diagrama De </a:t>
+            </a:r>
+          </a:p>
+          <a:p>
+            <a:pPr algn="ctr"/>
+            <a:r>
+              <a:rPr lang="es-ES" sz="2800" dirty="0">
+                <a:solidFill>
+                  <a:srgbClr val="274FB2"/>
+                </a:solidFill>
+                <a:latin typeface="Work Sans" panose="00000500000000000000" pitchFamily="2" charset="0"/>
+              </a:rPr>
+              <a:t>Despliegue</a:t>
+            </a:r>
+          </a:p>
+        </p:txBody>
+      </p:sp>
+      <p:sp>
+        <p:nvSpPr>
+          <p:cNvPr id="3" name="CuadroTexto 2">
+            <a:extLst>
+              <a:ext uri="{FF2B5EF4-FFF2-40B4-BE49-F238E27FC236}">
+                <a16:creationId xmlns:a16="http://schemas.microsoft.com/office/drawing/2014/main" id="{C655A4AD-972B-4B6F-9C7C-CE727012B3A4}"/>
+              </a:ext>
+            </a:extLst>
+          </p:cNvPr>
+          <p:cNvSpPr txBox="1"/>
+          <p:nvPr/>
+        </p:nvSpPr>
+        <p:spPr>
+          <a:xfrm>
+            <a:off x="4941744" y="1762712"/>
+            <a:ext cx="3804050" cy="1200329"/>
+          </a:xfrm>
+          <a:prstGeom prst="rect">
+            <a:avLst/>
+          </a:prstGeom>
+          <a:noFill/>
+        </p:spPr>
+        <p:txBody>
+          <a:bodyPr wrap="square" rtlCol="0">
+            <a:spAutoFit/>
+          </a:bodyPr>
+          <a:lstStyle/>
+          <a:p>
+            <a:pPr algn="just"/>
+            <a:r>
+              <a:rPr lang="es-CO" sz="2400" dirty="0">
+                <a:solidFill>
+                  <a:srgbClr val="274FB2"/>
+                </a:solidFill>
+              </a:rPr>
+              <a:t>Representación de la arquitectura en tiempo de ejecución de un programa.</a:t>
+            </a:r>
+          </a:p>
+        </p:txBody>
+      </p:sp>
+      <p:sp>
+        <p:nvSpPr>
+          <p:cNvPr id="4" name="Elipse 3">
+            <a:hlinkClick r:id="rId2" action="ppaction://hlinkfile"/>
+            <a:extLst>
+              <a:ext uri="{FF2B5EF4-FFF2-40B4-BE49-F238E27FC236}">
+                <a16:creationId xmlns:a16="http://schemas.microsoft.com/office/drawing/2014/main" id="{858938BA-0CBB-49FB-BDB2-610B064BC07D}"/>
+              </a:ext>
+            </a:extLst>
+          </p:cNvPr>
+          <p:cNvSpPr/>
+          <p:nvPr/>
+        </p:nvSpPr>
+        <p:spPr>
+          <a:xfrm>
+            <a:off x="7761768" y="4579984"/>
+            <a:ext cx="1212112" cy="422644"/>
+          </a:xfrm>
+          <a:prstGeom prst="ellipse">
+            <a:avLst/>
+          </a:prstGeom>
+        </p:spPr>
+        <p:style>
+          <a:lnRef idx="1">
+            <a:schemeClr val="accent1"/>
+          </a:lnRef>
+          <a:fillRef idx="3">
+            <a:schemeClr val="accent1"/>
+          </a:fillRef>
+          <a:effectRef idx="2">
+            <a:schemeClr val="accent1"/>
+          </a:effectRef>
+          <a:fontRef idx="minor">
+            <a:schemeClr val="lt1"/>
+          </a:fontRef>
+        </p:style>
+        <p:txBody>
+          <a:bodyPr rtlCol="0" anchor="ctr"/>
+          <a:lstStyle/>
+          <a:p>
+            <a:pPr algn="ctr"/>
+            <a:r>
+              <a:rPr lang="es-CO" dirty="0"/>
+              <a:t>DD</a:t>
+            </a:r>
+          </a:p>
+        </p:txBody>
+      </p:sp>
       <p:pic>
         <p:nvPicPr>
-          <p:cNvPr id="2" name="Imagen 1"/>
+          <p:cNvPr id="5" name="Imagen 4">
+            <a:extLst>
+              <a:ext uri="{FF2B5EF4-FFF2-40B4-BE49-F238E27FC236}">
+                <a16:creationId xmlns:a16="http://schemas.microsoft.com/office/drawing/2014/main" id="{71C9D9DC-7D04-41B2-844D-5AF5B2D66900}"/>
+              </a:ext>
+            </a:extLst>
+          </p:cNvPr>
           <p:cNvPicPr>
             <a:picLocks noChangeAspect="1"/>
           </p:cNvPicPr>
           <p:nvPr/>
         </p:nvPicPr>
         <p:blipFill>
-          <a:blip r:embed="rId2"/>
+          <a:blip r:embed="rId3"/>
           <a:stretch>
             <a:fillRect/>
           </a:stretch>
         </p:blipFill>
         <p:spPr>
           <a:xfrm>
-            <a:off x="191729" y="735882"/>
-            <a:ext cx="4218039" cy="3821369"/>
+            <a:off x="242515" y="365168"/>
+            <a:ext cx="4329485" cy="4426138"/>
           </a:xfrm>
           <a:prstGeom prst="rect">
             <a:avLst/>
           </a:prstGeom>
         </p:spPr>
       </p:pic>
-      <p:sp>
-        <p:nvSpPr>
-          <p:cNvPr id="3" name="CuadroTexto 2"/>
-          <p:cNvSpPr txBox="1"/>
-          <p:nvPr/>
-        </p:nvSpPr>
-        <p:spPr>
-          <a:xfrm>
-            <a:off x="6429233" y="296879"/>
-            <a:ext cx="829074" cy="523220"/>
-          </a:xfrm>
-          <a:prstGeom prst="rect">
-            <a:avLst/>
-          </a:prstGeom>
-          <a:noFill/>
-        </p:spPr>
-        <p:txBody>
-          <a:bodyPr wrap="none" rtlCol="0">
-            <a:spAutoFit/>
-          </a:bodyPr>
-          <a:lstStyle/>
-          <a:p>
-            <a:pPr algn="ctr"/>
-            <a:r>
-              <a:rPr lang="es-ES" sz="2800" dirty="0" err="1" smtClean="0">
-                <a:solidFill>
-                  <a:srgbClr val="274FB2"/>
-                </a:solidFill>
-                <a:latin typeface="Work Sans" panose="00000500000000000000" pitchFamily="2" charset="0"/>
-              </a:rPr>
-              <a:t>Git</a:t>
-            </a:r>
-            <a:endParaRPr lang="es-ES" sz="2800" dirty="0">
-              <a:solidFill>
-                <a:srgbClr val="274FB2"/>
-              </a:solidFill>
-              <a:latin typeface="Work Sans" panose="00000500000000000000" pitchFamily="2" charset="0"/>
-            </a:endParaRPr>
-          </a:p>
-        </p:txBody>
-      </p:sp>
-      <p:sp>
-        <p:nvSpPr>
-          <p:cNvPr id="4" name="CuadroTexto 3"/>
-          <p:cNvSpPr txBox="1"/>
-          <p:nvPr/>
-        </p:nvSpPr>
-        <p:spPr>
-          <a:xfrm>
-            <a:off x="4941744" y="1762712"/>
-            <a:ext cx="3804050" cy="2308324"/>
-          </a:xfrm>
-          <a:prstGeom prst="rect">
-            <a:avLst/>
-          </a:prstGeom>
-          <a:noFill/>
-        </p:spPr>
-        <p:txBody>
-          <a:bodyPr wrap="square" rtlCol="0">
-            <a:spAutoFit/>
-          </a:bodyPr>
-          <a:lstStyle/>
-          <a:p>
-            <a:pPr algn="just"/>
-            <a:r>
-              <a:rPr lang="es-CO" sz="2400" dirty="0" smtClean="0">
-                <a:solidFill>
-                  <a:srgbClr val="274FB2"/>
-                </a:solidFill>
-              </a:rPr>
-              <a:t>Sistema de gestión de versiones para ir guardando las versiones de un proyecto y así poder llevar una línea de evolución</a:t>
-            </a:r>
-            <a:r>
-              <a:rPr lang="es-CO" sz="2400" dirty="0" smtClean="0">
-                <a:solidFill>
-                  <a:srgbClr val="274FB2"/>
-                </a:solidFill>
-              </a:rPr>
-              <a:t> que se pueda identificar.</a:t>
-            </a:r>
-            <a:endParaRPr lang="es-CO" sz="2400" dirty="0">
-              <a:solidFill>
-                <a:srgbClr val="274FB2"/>
-              </a:solidFill>
-            </a:endParaRPr>
-          </a:p>
-        </p:txBody>
-      </p:sp>
     </p:spTree>
     <p:extLst>
       <p:ext uri="{BB962C8B-B14F-4D97-AF65-F5344CB8AC3E}">
-        <p14:creationId xmlns:p14="http://schemas.microsoft.com/office/powerpoint/2010/main" val="3300496259"/>
+        <p14:creationId xmlns:p14="http://schemas.microsoft.com/office/powerpoint/2010/main" val="3955761580"/>
       </p:ext>
     </p:extLst>
   </p:cSld>
@@ -5268,27 +5616,22 @@
       </p:grpSpPr>
       <p:pic>
         <p:nvPicPr>
-          <p:cNvPr id="6" name="Imagen 5" descr="EDITORIAL3.jpg"/>
+          <p:cNvPr id="2" name="Imagen 1"/>
           <p:cNvPicPr>
             <a:picLocks noChangeAspect="1"/>
           </p:cNvPicPr>
           <p:nvPr/>
         </p:nvPicPr>
-        <p:blipFill rotWithShape="1">
-          <a:blip r:embed="rId3">
-            <a:extLst>
-              <a:ext uri="{28A0092B-C50C-407E-A947-70E740481C1C}">
-                <a14:useLocalDpi xmlns:a14="http://schemas.microsoft.com/office/drawing/2010/main" val="0"/>
-              </a:ext>
-            </a:extLst>
-          </a:blip>
-          <a:srcRect t="14950"/>
-          <a:stretch/>
+        <p:blipFill>
+          <a:blip r:embed="rId2"/>
+          <a:stretch>
+            <a:fillRect/>
+          </a:stretch>
         </p:blipFill>
         <p:spPr>
           <a:xfrm>
-            <a:off x="-40669" y="-42990"/>
-            <a:ext cx="9225338" cy="5229480"/>
+            <a:off x="191729" y="735882"/>
+            <a:ext cx="4218039" cy="3821369"/>
           </a:xfrm>
           <a:prstGeom prst="rect">
             <a:avLst/>
@@ -5297,37 +5640,100 @@
       </p:pic>
       <p:sp>
         <p:nvSpPr>
-          <p:cNvPr id="3" name="Rectángulo 2"/>
-          <p:cNvSpPr/>
+          <p:cNvPr id="3" name="CuadroTexto 2"/>
+          <p:cNvSpPr txBox="1"/>
           <p:nvPr/>
         </p:nvSpPr>
         <p:spPr>
-          <a:xfrm rot="16200000">
-            <a:off x="4596461" y="599207"/>
-            <a:ext cx="5302242" cy="3955513"/>
+          <a:xfrm>
+            <a:off x="6429233" y="296879"/>
+            <a:ext cx="829074" cy="523220"/>
           </a:xfrm>
           <a:prstGeom prst="rect">
             <a:avLst/>
           </a:prstGeom>
-          <a:gradFill flip="none" rotWithShape="1">
-            <a:gsLst>
-              <a:gs pos="100000">
-                <a:schemeClr val="tx2">
-                  <a:alpha val="0"/>
-                </a:schemeClr>
-              </a:gs>
-              <a:gs pos="0">
-                <a:schemeClr val="tx1">
-                  <a:alpha val="46000"/>
-                </a:schemeClr>
-              </a:gs>
-            </a:gsLst>
-            <a:lin ang="16200000" scaled="0"/>
-            <a:tileRect/>
-          </a:gradFill>
-          <a:ln>
-            <a:noFill/>
-          </a:ln>
+          <a:noFill/>
+        </p:spPr>
+        <p:txBody>
+          <a:bodyPr wrap="none" rtlCol="0">
+            <a:spAutoFit/>
+          </a:bodyPr>
+          <a:lstStyle/>
+          <a:p>
+            <a:pPr algn="ctr"/>
+            <a:r>
+              <a:rPr lang="es-ES" sz="2800" dirty="0" err="1">
+                <a:solidFill>
+                  <a:srgbClr val="274FB2"/>
+                </a:solidFill>
+                <a:latin typeface="Work Sans" panose="00000500000000000000" pitchFamily="2" charset="0"/>
+              </a:rPr>
+              <a:t>Git</a:t>
+            </a:r>
+            <a:endParaRPr lang="es-ES" sz="2800" dirty="0">
+              <a:solidFill>
+                <a:srgbClr val="274FB2"/>
+              </a:solidFill>
+              <a:latin typeface="Work Sans" panose="00000500000000000000" pitchFamily="2" charset="0"/>
+            </a:endParaRPr>
+          </a:p>
+        </p:txBody>
+      </p:sp>
+      <p:sp>
+        <p:nvSpPr>
+          <p:cNvPr id="4" name="CuadroTexto 3"/>
+          <p:cNvSpPr txBox="1"/>
+          <p:nvPr/>
+        </p:nvSpPr>
+        <p:spPr>
+          <a:xfrm>
+            <a:off x="4941744" y="1762712"/>
+            <a:ext cx="3804050" cy="2308324"/>
+          </a:xfrm>
+          <a:prstGeom prst="rect">
+            <a:avLst/>
+          </a:prstGeom>
+          <a:noFill/>
+        </p:spPr>
+        <p:txBody>
+          <a:bodyPr wrap="square" rtlCol="0">
+            <a:spAutoFit/>
+          </a:bodyPr>
+          <a:lstStyle/>
+          <a:p>
+            <a:pPr algn="just"/>
+            <a:r>
+              <a:rPr lang="es-CO" sz="2400" dirty="0">
+                <a:solidFill>
+                  <a:srgbClr val="274FB2"/>
+                </a:solidFill>
+              </a:rPr>
+              <a:t>Sistema de gestión de versiones para ir guardando las versiones de un proyecto y así poder llevar una línea de evolución que se pueda identificar.</a:t>
+            </a:r>
+          </a:p>
+        </p:txBody>
+      </p:sp>
+      <p:sp>
+        <p:nvSpPr>
+          <p:cNvPr id="5" name="Elipse 4">
+            <a:hlinkClick r:id="rId3"/>
+            <a:extLst>
+              <a:ext uri="{FF2B5EF4-FFF2-40B4-BE49-F238E27FC236}">
+                <a16:creationId xmlns:a16="http://schemas.microsoft.com/office/drawing/2014/main" id="{A019667B-8E3C-4154-8D3E-C243BE7E7BB6}"/>
+              </a:ext>
+            </a:extLst>
+          </p:cNvPr>
+          <p:cNvSpPr/>
+          <p:nvPr/>
+        </p:nvSpPr>
+        <p:spPr>
+          <a:xfrm>
+            <a:off x="7761768" y="4579984"/>
+            <a:ext cx="1212112" cy="422644"/>
+          </a:xfrm>
+          <a:prstGeom prst="ellipse">
+            <a:avLst/>
+          </a:prstGeom>
         </p:spPr>
         <p:style>
           <a:lnRef idx="1">
@@ -5348,169 +5754,23 @@
           <a:lstStyle/>
           <a:p>
             <a:pPr algn="ctr"/>
-            <a:endParaRPr lang="es-ES"/>
-          </a:p>
-        </p:txBody>
-      </p:sp>
-      <p:sp>
-        <p:nvSpPr>
-          <p:cNvPr id="8" name="CuadroTexto 7"/>
-          <p:cNvSpPr txBox="1"/>
-          <p:nvPr/>
-        </p:nvSpPr>
-        <p:spPr>
-          <a:xfrm>
-            <a:off x="5888097" y="769998"/>
-            <a:ext cx="2780268" cy="461665"/>
-          </a:xfrm>
-          <a:prstGeom prst="rect">
-            <a:avLst/>
-          </a:prstGeom>
-          <a:noFill/>
-        </p:spPr>
-        <p:txBody>
-          <a:bodyPr wrap="square" rtlCol="0">
-            <a:spAutoFit/>
-          </a:bodyPr>
-          <a:lstStyle/>
-          <a:p>
-            <a:pPr algn="r"/>
-            <a:r>
-              <a:rPr lang="es-ES" sz="2400" b="1" dirty="0" smtClean="0">
-                <a:solidFill>
-                  <a:schemeClr val="bg1"/>
-                </a:solidFill>
-                <a:latin typeface="Work sans"/>
-                <a:cs typeface="Work sans"/>
-              </a:rPr>
-              <a:t>FRASE</a:t>
-            </a:r>
-          </a:p>
-        </p:txBody>
-      </p:sp>
-      <p:sp>
-        <p:nvSpPr>
-          <p:cNvPr id="9" name="CuadroTexto 8"/>
-          <p:cNvSpPr txBox="1"/>
-          <p:nvPr/>
-        </p:nvSpPr>
-        <p:spPr>
-          <a:xfrm>
-            <a:off x="5269826" y="1598585"/>
-            <a:ext cx="3398540" cy="2677656"/>
-          </a:xfrm>
-          <a:prstGeom prst="rect">
-            <a:avLst/>
-          </a:prstGeom>
-          <a:noFill/>
-        </p:spPr>
-        <p:txBody>
-          <a:bodyPr wrap="square" rtlCol="0">
-            <a:spAutoFit/>
-          </a:bodyPr>
-          <a:lstStyle/>
-          <a:p>
-            <a:pPr algn="r"/>
-            <a:r>
-              <a:rPr lang="es-ES" sz="2400" dirty="0" smtClean="0">
-                <a:solidFill>
-                  <a:schemeClr val="bg1"/>
-                </a:solidFill>
-                <a:latin typeface="Work sans"/>
-                <a:cs typeface="Work sans"/>
-              </a:rPr>
-              <a:t>El</a:t>
-            </a:r>
-            <a:r>
-              <a:rPr lang="es-ES" sz="2400" b="1" dirty="0" smtClean="0">
-                <a:solidFill>
-                  <a:schemeClr val="bg1"/>
-                </a:solidFill>
-                <a:latin typeface="Work sans"/>
-                <a:cs typeface="Work sans"/>
-              </a:rPr>
-              <a:t> éxito no se trata de tener suerte , la suerte la construyes con esfuerzo y dedicación.</a:t>
-            </a:r>
-            <a:endParaRPr lang="es-ES" sz="2400" b="1" dirty="0">
-              <a:solidFill>
-                <a:schemeClr val="bg1"/>
-              </a:solidFill>
-              <a:latin typeface="Work sans"/>
-              <a:cs typeface="Work sans"/>
-            </a:endParaRPr>
-          </a:p>
-        </p:txBody>
-      </p:sp>
-      <p:pic>
-        <p:nvPicPr>
-          <p:cNvPr id="11" name="Imagen 10"/>
-          <p:cNvPicPr>
-            <a:picLocks noChangeAspect="1"/>
-          </p:cNvPicPr>
-          <p:nvPr/>
-        </p:nvPicPr>
-        <p:blipFill>
-          <a:blip r:embed="rId4"/>
-          <a:stretch>
-            <a:fillRect/>
-          </a:stretch>
-        </p:blipFill>
-        <p:spPr>
-          <a:xfrm flipV="1">
-            <a:off x="7940706" y="1431751"/>
-            <a:ext cx="642357" cy="41563"/>
-          </a:xfrm>
-          <a:prstGeom prst="rect">
-            <a:avLst/>
-          </a:prstGeom>
-        </p:spPr>
-      </p:pic>
-      <p:pic>
-        <p:nvPicPr>
-          <p:cNvPr id="16" name="Imagen 15" descr="naranja.png"/>
-          <p:cNvPicPr>
-            <a:picLocks noChangeAspect="1"/>
-          </p:cNvPicPr>
-          <p:nvPr/>
-        </p:nvPicPr>
-        <p:blipFill rotWithShape="1">
-          <a:blip r:embed="rId5">
-            <a:extLst>
-              <a:ext uri="{28A0092B-C50C-407E-A947-70E740481C1C}">
-                <a14:useLocalDpi xmlns:a14="http://schemas.microsoft.com/office/drawing/2010/main" val="0"/>
-              </a:ext>
-            </a:extLst>
-          </a:blip>
-          <a:srcRect l="21032" t="19996" r="22452" b="17818"/>
-          <a:stretch/>
-        </p:blipFill>
-        <p:spPr>
-          <a:xfrm>
-            <a:off x="297204" y="290458"/>
-            <a:ext cx="601377" cy="603694"/>
-          </a:xfrm>
-          <a:prstGeom prst="rect">
-            <a:avLst/>
-          </a:prstGeom>
-        </p:spPr>
-      </p:pic>
+            <a:r>
+              <a:rPr lang="es-CO" dirty="0"/>
+              <a:t>Git</a:t>
+            </a:r>
+          </a:p>
+        </p:txBody>
+      </p:sp>
     </p:spTree>
     <p:extLst>
       <p:ext uri="{BB962C8B-B14F-4D97-AF65-F5344CB8AC3E}">
-        <p14:creationId xmlns:p14="http://schemas.microsoft.com/office/powerpoint/2010/main" val="47339120"/>
+        <p14:creationId xmlns:p14="http://schemas.microsoft.com/office/powerpoint/2010/main" val="3300496259"/>
       </p:ext>
     </p:extLst>
   </p:cSld>
   <p:clrMapOvr>
     <a:masterClrMapping/>
   </p:clrMapOvr>
-  <p:timing>
-    <p:tnLst>
-      <p:par>
-        <p:cTn id="1" dur="indefinite" restart="never" nodeType="tmRoot"/>
-      </p:par>
-    </p:tnLst>
-  </p:timing>
 </p:sld>
 </file>
 

</xml_diff>

<commit_message>
Se agrega diagrama de clases y se modifica presentación
</commit_message>
<xml_diff>
--- a/prestacion-proyecto.pptx
+++ b/prestacion-proyecto.pptx
@@ -218,7 +218,7 @@
           <a:p>
             <a:fld id="{821652C1-54FA-CD46-90EF-082DF126EC89}" type="datetimeFigureOut">
               <a:rPr lang="es-ES" smtClean="0"/>
-              <a:t>30/09/2019</a:t>
+              <a:t>01/10/2019</a:t>
             </a:fld>
             <a:endParaRPr lang="es-ES"/>
           </a:p>
@@ -1679,7 +1679,7 @@
           <a:p>
             <a:fld id="{9315191A-A0A9-294A-9DF6-EE4FF7E8A271}" type="datetimeFigureOut">
               <a:rPr lang="es-ES" smtClean="0"/>
-              <a:t>30/09/2019</a:t>
+              <a:t>01/10/2019</a:t>
             </a:fld>
             <a:endParaRPr lang="es-ES"/>
           </a:p>
@@ -1932,7 +1932,7 @@
           <a:p>
             <a:fld id="{9315191A-A0A9-294A-9DF6-EE4FF7E8A271}" type="datetimeFigureOut">
               <a:rPr lang="es-ES" smtClean="0"/>
-              <a:t>30/09/2019</a:t>
+              <a:t>01/10/2019</a:t>
             </a:fld>
             <a:endParaRPr lang="es-ES"/>
           </a:p>
@@ -2102,7 +2102,7 @@
           <a:p>
             <a:fld id="{9315191A-A0A9-294A-9DF6-EE4FF7E8A271}" type="datetimeFigureOut">
               <a:rPr lang="es-ES" smtClean="0"/>
-              <a:t>30/09/2019</a:t>
+              <a:t>01/10/2019</a:t>
             </a:fld>
             <a:endParaRPr lang="es-ES"/>
           </a:p>
@@ -2282,7 +2282,7 @@
           <a:p>
             <a:fld id="{9315191A-A0A9-294A-9DF6-EE4FF7E8A271}" type="datetimeFigureOut">
               <a:rPr lang="es-ES" smtClean="0"/>
-              <a:t>30/09/2019</a:t>
+              <a:t>01/10/2019</a:t>
             </a:fld>
             <a:endParaRPr lang="es-ES"/>
           </a:p>
@@ -2979,7 +2979,7 @@
           <a:p>
             <a:fld id="{9315191A-A0A9-294A-9DF6-EE4FF7E8A271}" type="datetimeFigureOut">
               <a:rPr lang="es-ES" smtClean="0"/>
-              <a:t>30/09/2019</a:t>
+              <a:t>01/10/2019</a:t>
             </a:fld>
             <a:endParaRPr lang="es-ES"/>
           </a:p>
@@ -3097,7 +3097,7 @@
           <a:p>
             <a:fld id="{9315191A-A0A9-294A-9DF6-EE4FF7E8A271}" type="datetimeFigureOut">
               <a:rPr lang="es-ES" smtClean="0"/>
-              <a:t>30/09/2019</a:t>
+              <a:t>01/10/2019</a:t>
             </a:fld>
             <a:endParaRPr lang="es-ES"/>
           </a:p>
@@ -3192,7 +3192,7 @@
           <a:p>
             <a:fld id="{9315191A-A0A9-294A-9DF6-EE4FF7E8A271}" type="datetimeFigureOut">
               <a:rPr lang="es-ES" smtClean="0"/>
-              <a:t>30/09/2019</a:t>
+              <a:t>01/10/2019</a:t>
             </a:fld>
             <a:endParaRPr lang="es-ES"/>
           </a:p>
@@ -3405,7 +3405,7 @@
           <a:p>
             <a:fld id="{9315191A-A0A9-294A-9DF6-EE4FF7E8A271}" type="datetimeFigureOut">
               <a:rPr lang="es-ES" smtClean="0"/>
-              <a:t>30/09/2019</a:t>
+              <a:t>01/10/2019</a:t>
             </a:fld>
             <a:endParaRPr lang="es-ES"/>
           </a:p>
@@ -3792,6 +3792,13 @@
   <p:clrMapOvr>
     <a:masterClrMapping/>
   </p:clrMapOvr>
+  <p:timing>
+    <p:tnLst>
+      <p:par>
+        <p:cTn id="1" dur="indefinite" restart="never" nodeType="tmRoot"/>
+      </p:par>
+    </p:tnLst>
+  </p:timing>
 </p:sld>
 </file>
 
@@ -4043,6 +4050,13 @@
   <p:clrMapOvr>
     <a:masterClrMapping/>
   </p:clrMapOvr>
+  <p:timing>
+    <p:tnLst>
+      <p:par>
+        <p:cTn id="1" dur="indefinite" restart="never" nodeType="tmRoot"/>
+      </p:par>
+    </p:tnLst>
+  </p:timing>
 </p:sld>
 </file>
 
@@ -4084,6 +4098,13 @@
   <p:clrMapOvr>
     <a:masterClrMapping/>
   </p:clrMapOvr>
+  <p:timing>
+    <p:tnLst>
+      <p:par>
+        <p:cTn id="1" dur="indefinite" restart="never" nodeType="tmRoot"/>
+      </p:par>
+    </p:tnLst>
+  </p:timing>
 </p:sld>
 </file>
 
@@ -4546,6 +4567,13 @@
   <p:clrMapOvr>
     <a:masterClrMapping/>
   </p:clrMapOvr>
+  <p:timing>
+    <p:tnLst>
+      <p:par>
+        <p:cTn id="1" dur="indefinite" restart="never" nodeType="tmRoot"/>
+      </p:par>
+    </p:tnLst>
+  </p:timing>
 </p:sld>
 </file>
 
@@ -4670,6 +4698,13 @@
   <p:clrMapOvr>
     <a:masterClrMapping/>
   </p:clrMapOvr>
+  <p:timing>
+    <p:tnLst>
+      <p:par>
+        <p:cTn id="1" dur="indefinite" restart="never" nodeType="tmRoot"/>
+      </p:par>
+    </p:tnLst>
+  </p:timing>
 </p:sld>
 </file>
 
@@ -4822,7 +4857,7 @@
           <a:p>
             <a:pPr algn="ctr"/>
             <a:r>
-              <a:rPr lang="es-CO" dirty="0">
+              <a:rPr lang="es-CO" dirty="0" smtClean="0">
                 <a:hlinkClick r:id="rId4" action="ppaction://hlinkfile"/>
               </a:rPr>
               <a:t>Project</a:t>
@@ -4841,6 +4876,13 @@
   <p:clrMapOvr>
     <a:masterClrMapping/>
   </p:clrMapOvr>
+  <p:timing>
+    <p:tnLst>
+      <p:par>
+        <p:cTn id="1" dur="indefinite" restart="never" nodeType="tmRoot"/>
+      </p:par>
+    </p:tnLst>
+  </p:timing>
 </p:sld>
 </file>
 
@@ -5024,6 +5066,13 @@
   <p:clrMapOvr>
     <a:masterClrMapping/>
   </p:clrMapOvr>
+  <p:timing>
+    <p:tnLst>
+      <p:par>
+        <p:cTn id="1" dur="indefinite" restart="never" nodeType="tmRoot"/>
+      </p:par>
+    </p:tnLst>
+  </p:timing>
 </p:sld>
 </file>
 
@@ -5154,6 +5203,7 @@
       <p:sp>
         <p:nvSpPr>
           <p:cNvPr id="7" name="Elipse 6">
+            <a:hlinkClick r:id="rId4" action="ppaction://hlinkfile"/>
             <a:extLst>
               <a:ext uri="{FF2B5EF4-FFF2-40B4-BE49-F238E27FC236}">
                 <a16:creationId xmlns:a16="http://schemas.microsoft.com/office/drawing/2014/main" id="{5A798C5D-466B-48DB-BFD4-9553E6446AAF}"/>
@@ -5211,6 +5261,13 @@
   <p:clrMapOvr>
     <a:masterClrMapping/>
   </p:clrMapOvr>
+  <p:timing>
+    <p:tnLst>
+      <p:par>
+        <p:cTn id="1" dur="indefinite" restart="never" nodeType="tmRoot"/>
+      </p:par>
+    </p:tnLst>
+  </p:timing>
 </p:sld>
 </file>
 
@@ -5377,9 +5434,12 @@
           <a:p>
             <a:pPr algn="ctr"/>
             <a:r>
-              <a:rPr lang="es-CO" dirty="0"/>
+              <a:rPr lang="es-CO" dirty="0" smtClean="0">
+                <a:hlinkClick r:id="rId3" action="ppaction://hlinkfile"/>
+              </a:rPr>
               <a:t>DC</a:t>
             </a:r>
+            <a:endParaRPr lang="es-CO" dirty="0"/>
           </a:p>
         </p:txBody>
       </p:sp>
@@ -5393,6 +5453,13 @@
   <p:clrMapOvr>
     <a:masterClrMapping/>
   </p:clrMapOvr>
+  <p:timing>
+    <p:tnLst>
+      <p:par>
+        <p:cTn id="1" dur="indefinite" restart="never" nodeType="tmRoot"/>
+      </p:par>
+    </p:tnLst>
+  </p:timing>
 </p:sld>
 </file>
 
@@ -5509,7 +5576,6 @@
       <p:sp>
         <p:nvSpPr>
           <p:cNvPr id="4" name="Elipse 3">
-            <a:hlinkClick r:id="rId2" action="ppaction://hlinkfile"/>
             <a:extLst>
               <a:ext uri="{FF2B5EF4-FFF2-40B4-BE49-F238E27FC236}">
                 <a16:creationId xmlns:a16="http://schemas.microsoft.com/office/drawing/2014/main" id="{858938BA-0CBB-49FB-BDB2-610B064BC07D}"/>
@@ -5548,9 +5614,12 @@
           <a:p>
             <a:pPr algn="ctr"/>
             <a:r>
-              <a:rPr lang="es-CO" dirty="0"/>
+              <a:rPr lang="es-CO" dirty="0">
+                <a:hlinkClick r:id="rId2" action="ppaction://hlinkfile"/>
+              </a:rPr>
               <a:t>DD</a:t>
             </a:r>
+            <a:endParaRPr lang="es-CO" dirty="0"/>
           </a:p>
         </p:txBody>
       </p:sp>
@@ -5594,6 +5663,13 @@
   <p:clrMapOvr>
     <a:masterClrMapping/>
   </p:clrMapOvr>
+  <p:timing>
+    <p:tnLst>
+      <p:par>
+        <p:cTn id="1" dur="indefinite" restart="never" nodeType="tmRoot"/>
+      </p:par>
+    </p:tnLst>
+  </p:timing>
 </p:sld>
 </file>
 
@@ -5771,6 +5847,13 @@
   <p:clrMapOvr>
     <a:masterClrMapping/>
   </p:clrMapOvr>
+  <p:timing>
+    <p:tnLst>
+      <p:par>
+        <p:cTn id="1" dur="indefinite" restart="never" nodeType="tmRoot"/>
+      </p:par>
+    </p:tnLst>
+  </p:timing>
 </p:sld>
 </file>
 

</xml_diff>

<commit_message>
Ardi y Stephen: Se arreglo presentación
</commit_message>
<xml_diff>
--- a/prestacion-proyecto.pptx
+++ b/prestacion-proyecto.pptx
@@ -218,7 +218,7 @@
           <a:p>
             <a:fld id="{821652C1-54FA-CD46-90EF-082DF126EC89}" type="datetimeFigureOut">
               <a:rPr lang="es-ES" smtClean="0"/>
-              <a:t>01/10/2019</a:t>
+              <a:t>02/10/2019</a:t>
             </a:fld>
             <a:endParaRPr lang="es-ES"/>
           </a:p>
@@ -1679,7 +1679,7 @@
           <a:p>
             <a:fld id="{9315191A-A0A9-294A-9DF6-EE4FF7E8A271}" type="datetimeFigureOut">
               <a:rPr lang="es-ES" smtClean="0"/>
-              <a:t>01/10/2019</a:t>
+              <a:t>02/10/2019</a:t>
             </a:fld>
             <a:endParaRPr lang="es-ES"/>
           </a:p>
@@ -1932,7 +1932,7 @@
           <a:p>
             <a:fld id="{9315191A-A0A9-294A-9DF6-EE4FF7E8A271}" type="datetimeFigureOut">
               <a:rPr lang="es-ES" smtClean="0"/>
-              <a:t>01/10/2019</a:t>
+              <a:t>02/10/2019</a:t>
             </a:fld>
             <a:endParaRPr lang="es-ES"/>
           </a:p>
@@ -2102,7 +2102,7 @@
           <a:p>
             <a:fld id="{9315191A-A0A9-294A-9DF6-EE4FF7E8A271}" type="datetimeFigureOut">
               <a:rPr lang="es-ES" smtClean="0"/>
-              <a:t>01/10/2019</a:t>
+              <a:t>02/10/2019</a:t>
             </a:fld>
             <a:endParaRPr lang="es-ES"/>
           </a:p>
@@ -2282,7 +2282,7 @@
           <a:p>
             <a:fld id="{9315191A-A0A9-294A-9DF6-EE4FF7E8A271}" type="datetimeFigureOut">
               <a:rPr lang="es-ES" smtClean="0"/>
-              <a:t>01/10/2019</a:t>
+              <a:t>02/10/2019</a:t>
             </a:fld>
             <a:endParaRPr lang="es-ES"/>
           </a:p>
@@ -2979,7 +2979,7 @@
           <a:p>
             <a:fld id="{9315191A-A0A9-294A-9DF6-EE4FF7E8A271}" type="datetimeFigureOut">
               <a:rPr lang="es-ES" smtClean="0"/>
-              <a:t>01/10/2019</a:t>
+              <a:t>02/10/2019</a:t>
             </a:fld>
             <a:endParaRPr lang="es-ES"/>
           </a:p>
@@ -3097,7 +3097,7 @@
           <a:p>
             <a:fld id="{9315191A-A0A9-294A-9DF6-EE4FF7E8A271}" type="datetimeFigureOut">
               <a:rPr lang="es-ES" smtClean="0"/>
-              <a:t>01/10/2019</a:t>
+              <a:t>02/10/2019</a:t>
             </a:fld>
             <a:endParaRPr lang="es-ES"/>
           </a:p>
@@ -3192,7 +3192,7 @@
           <a:p>
             <a:fld id="{9315191A-A0A9-294A-9DF6-EE4FF7E8A271}" type="datetimeFigureOut">
               <a:rPr lang="es-ES" smtClean="0"/>
-              <a:t>01/10/2019</a:t>
+              <a:t>02/10/2019</a:t>
             </a:fld>
             <a:endParaRPr lang="es-ES"/>
           </a:p>
@@ -3405,7 +3405,7 @@
           <a:p>
             <a:fld id="{9315191A-A0A9-294A-9DF6-EE4FF7E8A271}" type="datetimeFigureOut">
               <a:rPr lang="es-ES" smtClean="0"/>
-              <a:t>01/10/2019</a:t>
+              <a:t>02/10/2019</a:t>
             </a:fld>
             <a:endParaRPr lang="es-ES"/>
           </a:p>
@@ -4495,7 +4495,7 @@
         <p:spPr>
           <a:xfrm>
             <a:off x="1008690" y="3529600"/>
-            <a:ext cx="2274982" cy="369332"/>
+            <a:ext cx="2685351" cy="369332"/>
           </a:xfrm>
           <a:prstGeom prst="rect">
             <a:avLst/>
@@ -4509,15 +4509,22 @@
           <a:lstStyle/>
           <a:p>
             <a:r>
-              <a:rPr lang="es-ES" dirty="0">
+              <a:rPr lang="es-ES" dirty="0" smtClean="0">
                 <a:solidFill>
                   <a:schemeClr val="bg1"/>
                 </a:solidFill>
                 <a:latin typeface="Arial"/>
                 <a:cs typeface="Arial"/>
               </a:rPr>
-              <a:t>Diccionario de datos</a:t>
-            </a:r>
+              <a:t>Diagrama de despliegue</a:t>
+            </a:r>
+            <a:endParaRPr lang="es-ES" dirty="0">
+              <a:solidFill>
+                <a:schemeClr val="bg1"/>
+              </a:solidFill>
+              <a:latin typeface="Arial"/>
+              <a:cs typeface="Arial"/>
+            </a:endParaRPr>
           </a:p>
         </p:txBody>
       </p:sp>

</xml_diff>